<commit_message>
updated ppt slide size
</commit_message>
<xml_diff>
--- a/input/images-source/451.pptx
+++ b/input/images-source/451.pptx
@@ -2,18 +2,18 @@
 <file path=ppt/presentation.xml><?xml version="1.0" encoding="utf-8"?>
 <p:presentation xmlns:a="http://schemas.openxmlformats.org/drawingml/2006/main" xmlns:r="http://schemas.openxmlformats.org/officeDocument/2006/relationships" xmlns:p="http://schemas.openxmlformats.org/presentationml/2006/main" saveSubsetFonts="1">
   <p:sldMasterIdLst>
-    <p:sldMasterId id="2147483648" r:id="rId1"/>
+    <p:sldMasterId id="2147483660" r:id="rId1"/>
   </p:sldMasterIdLst>
   <p:sldIdLst>
     <p:sldId id="257" r:id="rId2"/>
   </p:sldIdLst>
-  <p:sldSz cx="12192000" cy="6858000"/>
+  <p:sldSz cx="9144000" cy="6858000" type="screen4x3"/>
   <p:notesSz cx="6858000" cy="9144000"/>
   <p:defaultTextStyle>
     <a:defPPr>
       <a:defRPr lang="en-US"/>
     </a:defPPr>
-    <a:lvl1pPr marL="0" algn="l" defTabSz="914400" rtl="0" eaLnBrk="1" latinLnBrk="0" hangingPunct="1">
+    <a:lvl1pPr marL="0" algn="l" defTabSz="457200" rtl="0" eaLnBrk="1" latinLnBrk="0" hangingPunct="1">
       <a:defRPr sz="1800" kern="1200">
         <a:solidFill>
           <a:schemeClr val="tx1"/>
@@ -23,7 +23,7 @@
         <a:cs typeface="+mn-cs"/>
       </a:defRPr>
     </a:lvl1pPr>
-    <a:lvl2pPr marL="457200" algn="l" defTabSz="914400" rtl="0" eaLnBrk="1" latinLnBrk="0" hangingPunct="1">
+    <a:lvl2pPr marL="457200" algn="l" defTabSz="457200" rtl="0" eaLnBrk="1" latinLnBrk="0" hangingPunct="1">
       <a:defRPr sz="1800" kern="1200">
         <a:solidFill>
           <a:schemeClr val="tx1"/>
@@ -33,7 +33,7 @@
         <a:cs typeface="+mn-cs"/>
       </a:defRPr>
     </a:lvl2pPr>
-    <a:lvl3pPr marL="914400" algn="l" defTabSz="914400" rtl="0" eaLnBrk="1" latinLnBrk="0" hangingPunct="1">
+    <a:lvl3pPr marL="914400" algn="l" defTabSz="457200" rtl="0" eaLnBrk="1" latinLnBrk="0" hangingPunct="1">
       <a:defRPr sz="1800" kern="1200">
         <a:solidFill>
           <a:schemeClr val="tx1"/>
@@ -43,7 +43,7 @@
         <a:cs typeface="+mn-cs"/>
       </a:defRPr>
     </a:lvl3pPr>
-    <a:lvl4pPr marL="1371600" algn="l" defTabSz="914400" rtl="0" eaLnBrk="1" latinLnBrk="0" hangingPunct="1">
+    <a:lvl4pPr marL="1371600" algn="l" defTabSz="457200" rtl="0" eaLnBrk="1" latinLnBrk="0" hangingPunct="1">
       <a:defRPr sz="1800" kern="1200">
         <a:solidFill>
           <a:schemeClr val="tx1"/>
@@ -53,7 +53,7 @@
         <a:cs typeface="+mn-cs"/>
       </a:defRPr>
     </a:lvl4pPr>
-    <a:lvl5pPr marL="1828800" algn="l" defTabSz="914400" rtl="0" eaLnBrk="1" latinLnBrk="0" hangingPunct="1">
+    <a:lvl5pPr marL="1828800" algn="l" defTabSz="457200" rtl="0" eaLnBrk="1" latinLnBrk="0" hangingPunct="1">
       <a:defRPr sz="1800" kern="1200">
         <a:solidFill>
           <a:schemeClr val="tx1"/>
@@ -63,7 +63,7 @@
         <a:cs typeface="+mn-cs"/>
       </a:defRPr>
     </a:lvl5pPr>
-    <a:lvl6pPr marL="2286000" algn="l" defTabSz="914400" rtl="0" eaLnBrk="1" latinLnBrk="0" hangingPunct="1">
+    <a:lvl6pPr marL="2286000" algn="l" defTabSz="457200" rtl="0" eaLnBrk="1" latinLnBrk="0" hangingPunct="1">
       <a:defRPr sz="1800" kern="1200">
         <a:solidFill>
           <a:schemeClr val="tx1"/>
@@ -73,7 +73,7 @@
         <a:cs typeface="+mn-cs"/>
       </a:defRPr>
     </a:lvl6pPr>
-    <a:lvl7pPr marL="2743200" algn="l" defTabSz="914400" rtl="0" eaLnBrk="1" latinLnBrk="0" hangingPunct="1">
+    <a:lvl7pPr marL="2743200" algn="l" defTabSz="457200" rtl="0" eaLnBrk="1" latinLnBrk="0" hangingPunct="1">
       <a:defRPr sz="1800" kern="1200">
         <a:solidFill>
           <a:schemeClr val="tx1"/>
@@ -83,7 +83,7 @@
         <a:cs typeface="+mn-cs"/>
       </a:defRPr>
     </a:lvl7pPr>
-    <a:lvl8pPr marL="3200400" algn="l" defTabSz="914400" rtl="0" eaLnBrk="1" latinLnBrk="0" hangingPunct="1">
+    <a:lvl8pPr marL="3200400" algn="l" defTabSz="457200" rtl="0" eaLnBrk="1" latinLnBrk="0" hangingPunct="1">
       <a:defRPr sz="1800" kern="1200">
         <a:solidFill>
           <a:schemeClr val="tx1"/>
@@ -93,7 +93,7 @@
         <a:cs typeface="+mn-cs"/>
       </a:defRPr>
     </a:lvl8pPr>
-    <a:lvl9pPr marL="3657600" algn="l" defTabSz="914400" rtl="0" eaLnBrk="1" latinLnBrk="0" hangingPunct="1">
+    <a:lvl9pPr marL="3657600" algn="l" defTabSz="457200" rtl="0" eaLnBrk="1" latinLnBrk="0" hangingPunct="1">
       <a:defRPr sz="1800" kern="1200">
         <a:solidFill>
           <a:schemeClr val="tx1"/>
@@ -104,6 +104,11 @@
       </a:defRPr>
     </a:lvl9pPr>
   </p:defaultTextStyle>
+  <p:extLst>
+    <p:ext uri="{EFAFB233-063F-42B5-8137-9DF3F51BA10A}">
+      <p15:sldGuideLst xmlns:p15="http://schemas.microsoft.com/office/powerpoint/2012/main"/>
+    </p:ext>
+  </p:extLst>
 </p:presentation>
 </file>
 
@@ -3350,13 +3355,7 @@
       </p:grpSpPr>
       <p:sp>
         <p:nvSpPr>
-          <p:cNvPr id="2" name="Title 1">
-            <a:extLst>
-              <a:ext uri="{FF2B5EF4-FFF2-40B4-BE49-F238E27FC236}">
-                <a16:creationId xmlns:a16="http://schemas.microsoft.com/office/drawing/2014/main" id="{A2793C92-74FF-F27F-33DC-0C59F0BF1539}"/>
-              </a:ext>
-            </a:extLst>
-          </p:cNvPr>
+          <p:cNvPr id="2" name="Title 1"/>
           <p:cNvSpPr>
             <a:spLocks noGrp="1"/>
           </p:cNvSpPr>
@@ -3366,8 +3365,8 @@
         </p:nvSpPr>
         <p:spPr>
           <a:xfrm>
-            <a:off x="1524000" y="1122363"/>
-            <a:ext cx="9144000" cy="2387600"/>
+            <a:off x="685800" y="1122363"/>
+            <a:ext cx="7772400" cy="2387600"/>
           </a:xfrm>
         </p:spPr>
         <p:txBody>
@@ -3382,18 +3381,13 @@
               <a:rPr lang="en-US"/>
               <a:t>Click to edit Master title style</a:t>
             </a:r>
+            <a:endParaRPr lang="en-US" dirty="0"/>
           </a:p>
         </p:txBody>
       </p:sp>
       <p:sp>
         <p:nvSpPr>
-          <p:cNvPr id="3" name="Subtitle 2">
-            <a:extLst>
-              <a:ext uri="{FF2B5EF4-FFF2-40B4-BE49-F238E27FC236}">
-                <a16:creationId xmlns:a16="http://schemas.microsoft.com/office/drawing/2014/main" id="{57E8E63C-9DA5-A1B1-A3B1-9333BA773441}"/>
-              </a:ext>
-            </a:extLst>
-          </p:cNvPr>
+          <p:cNvPr id="3" name="Subtitle 2"/>
           <p:cNvSpPr>
             <a:spLocks noGrp="1"/>
           </p:cNvSpPr>
@@ -3403,8 +3397,8 @@
         </p:nvSpPr>
         <p:spPr>
           <a:xfrm>
-            <a:off x="1524000" y="3602038"/>
-            <a:ext cx="9144000" cy="1655762"/>
+            <a:off x="1143000" y="3602038"/>
+            <a:ext cx="6858000" cy="1655762"/>
           </a:xfrm>
         </p:spPr>
         <p:txBody>
@@ -3452,18 +3446,13 @@
               <a:rPr lang="en-US"/>
               <a:t>Click to edit Master subtitle style</a:t>
             </a:r>
+            <a:endParaRPr lang="en-US" dirty="0"/>
           </a:p>
         </p:txBody>
       </p:sp>
       <p:sp>
         <p:nvSpPr>
-          <p:cNvPr id="4" name="Date Placeholder 3">
-            <a:extLst>
-              <a:ext uri="{FF2B5EF4-FFF2-40B4-BE49-F238E27FC236}">
-                <a16:creationId xmlns:a16="http://schemas.microsoft.com/office/drawing/2014/main" id="{C01202AE-5C75-3040-7439-A49C789B5F13}"/>
-              </a:ext>
-            </a:extLst>
-          </p:cNvPr>
+          <p:cNvPr id="4" name="Date Placeholder 3"/>
           <p:cNvSpPr>
             <a:spLocks noGrp="1"/>
           </p:cNvSpPr>
@@ -3478,7 +3467,7 @@
           <a:p>
             <a:fld id="{8F18092E-BB42-4CB3-BFC1-7684CC8B4702}" type="datetimeFigureOut">
               <a:rPr lang="en-US" smtClean="0"/>
-              <a:t>1/6/2023</a:t>
+              <a:t>1/12/2023</a:t>
             </a:fld>
             <a:endParaRPr lang="en-US"/>
           </a:p>
@@ -3486,13 +3475,7 @@
       </p:sp>
       <p:sp>
         <p:nvSpPr>
-          <p:cNvPr id="5" name="Footer Placeholder 4">
-            <a:extLst>
-              <a:ext uri="{FF2B5EF4-FFF2-40B4-BE49-F238E27FC236}">
-                <a16:creationId xmlns:a16="http://schemas.microsoft.com/office/drawing/2014/main" id="{470D3FB2-5BED-BCBD-B1A9-1C3E52CBE0D5}"/>
-              </a:ext>
-            </a:extLst>
-          </p:cNvPr>
+          <p:cNvPr id="5" name="Footer Placeholder 4"/>
           <p:cNvSpPr>
             <a:spLocks noGrp="1"/>
           </p:cNvSpPr>
@@ -3511,13 +3494,7 @@
       </p:sp>
       <p:sp>
         <p:nvSpPr>
-          <p:cNvPr id="6" name="Slide Number Placeholder 5">
-            <a:extLst>
-              <a:ext uri="{FF2B5EF4-FFF2-40B4-BE49-F238E27FC236}">
-                <a16:creationId xmlns:a16="http://schemas.microsoft.com/office/drawing/2014/main" id="{9D171B86-B8BF-56A1-8459-9786C10F3FEA}"/>
-              </a:ext>
-            </a:extLst>
-          </p:cNvPr>
+          <p:cNvPr id="6" name="Slide Number Placeholder 5"/>
           <p:cNvSpPr>
             <a:spLocks noGrp="1"/>
           </p:cNvSpPr>
@@ -3541,7 +3518,7 @@
     </p:spTree>
     <p:extLst>
       <p:ext uri="{BB962C8B-B14F-4D97-AF65-F5344CB8AC3E}">
-        <p14:creationId xmlns:p14="http://schemas.microsoft.com/office/powerpoint/2010/main" val="2062493791"/>
+        <p14:creationId xmlns:p14="http://schemas.microsoft.com/office/powerpoint/2010/main" val="844404795"/>
       </p:ext>
     </p:extLst>
   </p:cSld>
@@ -3570,13 +3547,7 @@
       </p:grpSpPr>
       <p:sp>
         <p:nvSpPr>
-          <p:cNvPr id="2" name="Title 1">
-            <a:extLst>
-              <a:ext uri="{FF2B5EF4-FFF2-40B4-BE49-F238E27FC236}">
-                <a16:creationId xmlns:a16="http://schemas.microsoft.com/office/drawing/2014/main" id="{B3D31E3E-A7AF-1243-97F6-A89D3968FD4D}"/>
-              </a:ext>
-            </a:extLst>
-          </p:cNvPr>
+          <p:cNvPr id="2" name="Title 1"/>
           <p:cNvSpPr>
             <a:spLocks noGrp="1"/>
           </p:cNvSpPr>
@@ -3593,18 +3564,13 @@
               <a:rPr lang="en-US"/>
               <a:t>Click to edit Master title style</a:t>
             </a:r>
+            <a:endParaRPr lang="en-US" dirty="0"/>
           </a:p>
         </p:txBody>
       </p:sp>
       <p:sp>
         <p:nvSpPr>
-          <p:cNvPr id="3" name="Vertical Text Placeholder 2">
-            <a:extLst>
-              <a:ext uri="{FF2B5EF4-FFF2-40B4-BE49-F238E27FC236}">
-                <a16:creationId xmlns:a16="http://schemas.microsoft.com/office/drawing/2014/main" id="{D1FB93D2-5D36-D0B8-54D5-EA43CD9BDBC6}"/>
-              </a:ext>
-            </a:extLst>
-          </p:cNvPr>
+          <p:cNvPr id="3" name="Vertical Text Placeholder 2"/>
           <p:cNvSpPr>
             <a:spLocks noGrp="1"/>
           </p:cNvSpPr>
@@ -3650,18 +3616,13 @@
               <a:rPr lang="en-US"/>
               <a:t>Fifth level</a:t>
             </a:r>
+            <a:endParaRPr lang="en-US" dirty="0"/>
           </a:p>
         </p:txBody>
       </p:sp>
       <p:sp>
         <p:nvSpPr>
-          <p:cNvPr id="4" name="Date Placeholder 3">
-            <a:extLst>
-              <a:ext uri="{FF2B5EF4-FFF2-40B4-BE49-F238E27FC236}">
-                <a16:creationId xmlns:a16="http://schemas.microsoft.com/office/drawing/2014/main" id="{49AB2AA2-E9A6-F89A-4099-D9CF5588F97B}"/>
-              </a:ext>
-            </a:extLst>
-          </p:cNvPr>
+          <p:cNvPr id="4" name="Date Placeholder 3"/>
           <p:cNvSpPr>
             <a:spLocks noGrp="1"/>
           </p:cNvSpPr>
@@ -3676,7 +3637,7 @@
           <a:p>
             <a:fld id="{8F18092E-BB42-4CB3-BFC1-7684CC8B4702}" type="datetimeFigureOut">
               <a:rPr lang="en-US" smtClean="0"/>
-              <a:t>1/6/2023</a:t>
+              <a:t>1/12/2023</a:t>
             </a:fld>
             <a:endParaRPr lang="en-US"/>
           </a:p>
@@ -3684,13 +3645,7 @@
       </p:sp>
       <p:sp>
         <p:nvSpPr>
-          <p:cNvPr id="5" name="Footer Placeholder 4">
-            <a:extLst>
-              <a:ext uri="{FF2B5EF4-FFF2-40B4-BE49-F238E27FC236}">
-                <a16:creationId xmlns:a16="http://schemas.microsoft.com/office/drawing/2014/main" id="{D79F2681-A898-7EC2-E6E5-CF3633EB99EC}"/>
-              </a:ext>
-            </a:extLst>
-          </p:cNvPr>
+          <p:cNvPr id="5" name="Footer Placeholder 4"/>
           <p:cNvSpPr>
             <a:spLocks noGrp="1"/>
           </p:cNvSpPr>
@@ -3709,13 +3664,7 @@
       </p:sp>
       <p:sp>
         <p:nvSpPr>
-          <p:cNvPr id="6" name="Slide Number Placeholder 5">
-            <a:extLst>
-              <a:ext uri="{FF2B5EF4-FFF2-40B4-BE49-F238E27FC236}">
-                <a16:creationId xmlns:a16="http://schemas.microsoft.com/office/drawing/2014/main" id="{6E0C109C-CD42-A7BE-E702-C19407A5BECF}"/>
-              </a:ext>
-            </a:extLst>
-          </p:cNvPr>
+          <p:cNvPr id="6" name="Slide Number Placeholder 5"/>
           <p:cNvSpPr>
             <a:spLocks noGrp="1"/>
           </p:cNvSpPr>
@@ -3739,7 +3688,7 @@
     </p:spTree>
     <p:extLst>
       <p:ext uri="{BB962C8B-B14F-4D97-AF65-F5344CB8AC3E}">
-        <p14:creationId xmlns:p14="http://schemas.microsoft.com/office/powerpoint/2010/main" val="740024459"/>
+        <p14:creationId xmlns:p14="http://schemas.microsoft.com/office/powerpoint/2010/main" val="1098644795"/>
       </p:ext>
     </p:extLst>
   </p:cSld>
@@ -3768,13 +3717,7 @@
       </p:grpSpPr>
       <p:sp>
         <p:nvSpPr>
-          <p:cNvPr id="2" name="Vertical Title 1">
-            <a:extLst>
-              <a:ext uri="{FF2B5EF4-FFF2-40B4-BE49-F238E27FC236}">
-                <a16:creationId xmlns:a16="http://schemas.microsoft.com/office/drawing/2014/main" id="{D7EF21DA-5C95-44D6-72DD-69DBD7151D3D}"/>
-              </a:ext>
-            </a:extLst>
-          </p:cNvPr>
+          <p:cNvPr id="2" name="Vertical Title 1"/>
           <p:cNvSpPr>
             <a:spLocks noGrp="1"/>
           </p:cNvSpPr>
@@ -3784,8 +3727,8 @@
         </p:nvSpPr>
         <p:spPr>
           <a:xfrm>
-            <a:off x="8724900" y="365125"/>
-            <a:ext cx="2628900" cy="5811838"/>
+            <a:off x="6543675" y="365125"/>
+            <a:ext cx="1971675" cy="5811838"/>
           </a:xfrm>
         </p:spPr>
         <p:txBody>
@@ -3796,18 +3739,13 @@
               <a:rPr lang="en-US"/>
               <a:t>Click to edit Master title style</a:t>
             </a:r>
+            <a:endParaRPr lang="en-US" dirty="0"/>
           </a:p>
         </p:txBody>
       </p:sp>
       <p:sp>
         <p:nvSpPr>
-          <p:cNvPr id="3" name="Vertical Text Placeholder 2">
-            <a:extLst>
-              <a:ext uri="{FF2B5EF4-FFF2-40B4-BE49-F238E27FC236}">
-                <a16:creationId xmlns:a16="http://schemas.microsoft.com/office/drawing/2014/main" id="{993FD2EC-292F-4D0B-F71D-14EB4619C298}"/>
-              </a:ext>
-            </a:extLst>
-          </p:cNvPr>
+          <p:cNvPr id="3" name="Vertical Text Placeholder 2"/>
           <p:cNvSpPr>
             <a:spLocks noGrp="1"/>
           </p:cNvSpPr>
@@ -3817,8 +3755,8 @@
         </p:nvSpPr>
         <p:spPr>
           <a:xfrm>
-            <a:off x="838200" y="365125"/>
-            <a:ext cx="7734300" cy="5811838"/>
+            <a:off x="628650" y="365125"/>
+            <a:ext cx="5800725" cy="5811838"/>
           </a:xfrm>
         </p:spPr>
         <p:txBody>
@@ -3858,18 +3796,13 @@
               <a:rPr lang="en-US"/>
               <a:t>Fifth level</a:t>
             </a:r>
+            <a:endParaRPr lang="en-US" dirty="0"/>
           </a:p>
         </p:txBody>
       </p:sp>
       <p:sp>
         <p:nvSpPr>
-          <p:cNvPr id="4" name="Date Placeholder 3">
-            <a:extLst>
-              <a:ext uri="{FF2B5EF4-FFF2-40B4-BE49-F238E27FC236}">
-                <a16:creationId xmlns:a16="http://schemas.microsoft.com/office/drawing/2014/main" id="{0CE9FD9F-4533-311F-9EF6-1966C423F07C}"/>
-              </a:ext>
-            </a:extLst>
-          </p:cNvPr>
+          <p:cNvPr id="4" name="Date Placeholder 3"/>
           <p:cNvSpPr>
             <a:spLocks noGrp="1"/>
           </p:cNvSpPr>
@@ -3884,7 +3817,7 @@
           <a:p>
             <a:fld id="{8F18092E-BB42-4CB3-BFC1-7684CC8B4702}" type="datetimeFigureOut">
               <a:rPr lang="en-US" smtClean="0"/>
-              <a:t>1/6/2023</a:t>
+              <a:t>1/12/2023</a:t>
             </a:fld>
             <a:endParaRPr lang="en-US"/>
           </a:p>
@@ -3892,13 +3825,7 @@
       </p:sp>
       <p:sp>
         <p:nvSpPr>
-          <p:cNvPr id="5" name="Footer Placeholder 4">
-            <a:extLst>
-              <a:ext uri="{FF2B5EF4-FFF2-40B4-BE49-F238E27FC236}">
-                <a16:creationId xmlns:a16="http://schemas.microsoft.com/office/drawing/2014/main" id="{579544FD-AEBD-7E10-7A84-CD68B354E16B}"/>
-              </a:ext>
-            </a:extLst>
-          </p:cNvPr>
+          <p:cNvPr id="5" name="Footer Placeholder 4"/>
           <p:cNvSpPr>
             <a:spLocks noGrp="1"/>
           </p:cNvSpPr>
@@ -3917,13 +3844,7 @@
       </p:sp>
       <p:sp>
         <p:nvSpPr>
-          <p:cNvPr id="6" name="Slide Number Placeholder 5">
-            <a:extLst>
-              <a:ext uri="{FF2B5EF4-FFF2-40B4-BE49-F238E27FC236}">
-                <a16:creationId xmlns:a16="http://schemas.microsoft.com/office/drawing/2014/main" id="{8BC5DE15-4397-3321-C8EF-8ED95AEDC541}"/>
-              </a:ext>
-            </a:extLst>
-          </p:cNvPr>
+          <p:cNvPr id="6" name="Slide Number Placeholder 5"/>
           <p:cNvSpPr>
             <a:spLocks noGrp="1"/>
           </p:cNvSpPr>
@@ -3947,7 +3868,7 @@
     </p:spTree>
     <p:extLst>
       <p:ext uri="{BB962C8B-B14F-4D97-AF65-F5344CB8AC3E}">
-        <p14:creationId xmlns:p14="http://schemas.microsoft.com/office/powerpoint/2010/main" val="2500644830"/>
+        <p14:creationId xmlns:p14="http://schemas.microsoft.com/office/powerpoint/2010/main" val="207107616"/>
       </p:ext>
     </p:extLst>
   </p:cSld>
@@ -3976,13 +3897,7 @@
       </p:grpSpPr>
       <p:sp>
         <p:nvSpPr>
-          <p:cNvPr id="2" name="Title 1">
-            <a:extLst>
-              <a:ext uri="{FF2B5EF4-FFF2-40B4-BE49-F238E27FC236}">
-                <a16:creationId xmlns:a16="http://schemas.microsoft.com/office/drawing/2014/main" id="{7D2E30CD-EFFA-5031-3DB4-DEEB4F50537B}"/>
-              </a:ext>
-            </a:extLst>
-          </p:cNvPr>
+          <p:cNvPr id="2" name="Title 1"/>
           <p:cNvSpPr>
             <a:spLocks noGrp="1"/>
           </p:cNvSpPr>
@@ -3999,18 +3914,13 @@
               <a:rPr lang="en-US"/>
               <a:t>Click to edit Master title style</a:t>
             </a:r>
+            <a:endParaRPr lang="en-US" dirty="0"/>
           </a:p>
         </p:txBody>
       </p:sp>
       <p:sp>
         <p:nvSpPr>
-          <p:cNvPr id="3" name="Content Placeholder 2">
-            <a:extLst>
-              <a:ext uri="{FF2B5EF4-FFF2-40B4-BE49-F238E27FC236}">
-                <a16:creationId xmlns:a16="http://schemas.microsoft.com/office/drawing/2014/main" id="{F42E35FE-9BD6-A99C-B725-5CDEB25990C0}"/>
-              </a:ext>
-            </a:extLst>
-          </p:cNvPr>
+          <p:cNvPr id="3" name="Content Placeholder 2"/>
           <p:cNvSpPr>
             <a:spLocks noGrp="1"/>
           </p:cNvSpPr>
@@ -4056,18 +3966,13 @@
               <a:rPr lang="en-US"/>
               <a:t>Fifth level</a:t>
             </a:r>
+            <a:endParaRPr lang="en-US" dirty="0"/>
           </a:p>
         </p:txBody>
       </p:sp>
       <p:sp>
         <p:nvSpPr>
-          <p:cNvPr id="4" name="Date Placeholder 3">
-            <a:extLst>
-              <a:ext uri="{FF2B5EF4-FFF2-40B4-BE49-F238E27FC236}">
-                <a16:creationId xmlns:a16="http://schemas.microsoft.com/office/drawing/2014/main" id="{0016AB9C-6A6B-D60C-320B-2F4CA0502BF9}"/>
-              </a:ext>
-            </a:extLst>
-          </p:cNvPr>
+          <p:cNvPr id="4" name="Date Placeholder 3"/>
           <p:cNvSpPr>
             <a:spLocks noGrp="1"/>
           </p:cNvSpPr>
@@ -4082,7 +3987,7 @@
           <a:p>
             <a:fld id="{8F18092E-BB42-4CB3-BFC1-7684CC8B4702}" type="datetimeFigureOut">
               <a:rPr lang="en-US" smtClean="0"/>
-              <a:t>1/6/2023</a:t>
+              <a:t>1/12/2023</a:t>
             </a:fld>
             <a:endParaRPr lang="en-US"/>
           </a:p>
@@ -4090,13 +3995,7 @@
       </p:sp>
       <p:sp>
         <p:nvSpPr>
-          <p:cNvPr id="5" name="Footer Placeholder 4">
-            <a:extLst>
-              <a:ext uri="{FF2B5EF4-FFF2-40B4-BE49-F238E27FC236}">
-                <a16:creationId xmlns:a16="http://schemas.microsoft.com/office/drawing/2014/main" id="{76AFD77F-0D9A-1F4C-D2C2-5E3D99F4A5D7}"/>
-              </a:ext>
-            </a:extLst>
-          </p:cNvPr>
+          <p:cNvPr id="5" name="Footer Placeholder 4"/>
           <p:cNvSpPr>
             <a:spLocks noGrp="1"/>
           </p:cNvSpPr>
@@ -4115,13 +4014,7 @@
       </p:sp>
       <p:sp>
         <p:nvSpPr>
-          <p:cNvPr id="6" name="Slide Number Placeholder 5">
-            <a:extLst>
-              <a:ext uri="{FF2B5EF4-FFF2-40B4-BE49-F238E27FC236}">
-                <a16:creationId xmlns:a16="http://schemas.microsoft.com/office/drawing/2014/main" id="{013AA292-2D05-4818-D93F-092CD1B8891D}"/>
-              </a:ext>
-            </a:extLst>
-          </p:cNvPr>
+          <p:cNvPr id="6" name="Slide Number Placeholder 5"/>
           <p:cNvSpPr>
             <a:spLocks noGrp="1"/>
           </p:cNvSpPr>
@@ -4145,7 +4038,7 @@
     </p:spTree>
     <p:extLst>
       <p:ext uri="{BB962C8B-B14F-4D97-AF65-F5344CB8AC3E}">
-        <p14:creationId xmlns:p14="http://schemas.microsoft.com/office/powerpoint/2010/main" val="752382143"/>
+        <p14:creationId xmlns:p14="http://schemas.microsoft.com/office/powerpoint/2010/main" val="311659060"/>
       </p:ext>
     </p:extLst>
   </p:cSld>
@@ -4174,13 +4067,7 @@
       </p:grpSpPr>
       <p:sp>
         <p:nvSpPr>
-          <p:cNvPr id="2" name="Title 1">
-            <a:extLst>
-              <a:ext uri="{FF2B5EF4-FFF2-40B4-BE49-F238E27FC236}">
-                <a16:creationId xmlns:a16="http://schemas.microsoft.com/office/drawing/2014/main" id="{E315176A-E6C9-5C45-B786-784F68038FE6}"/>
-              </a:ext>
-            </a:extLst>
-          </p:cNvPr>
+          <p:cNvPr id="2" name="Title 1"/>
           <p:cNvSpPr>
             <a:spLocks noGrp="1"/>
           </p:cNvSpPr>
@@ -4190,8 +4077,8 @@
         </p:nvSpPr>
         <p:spPr>
           <a:xfrm>
-            <a:off x="831850" y="1709738"/>
-            <a:ext cx="10515600" cy="2852737"/>
+            <a:off x="623888" y="1709739"/>
+            <a:ext cx="7886700" cy="2852737"/>
           </a:xfrm>
         </p:spPr>
         <p:txBody>
@@ -4206,18 +4093,13 @@
               <a:rPr lang="en-US"/>
               <a:t>Click to edit Master title style</a:t>
             </a:r>
+            <a:endParaRPr lang="en-US" dirty="0"/>
           </a:p>
         </p:txBody>
       </p:sp>
       <p:sp>
         <p:nvSpPr>
-          <p:cNvPr id="3" name="Text Placeholder 2">
-            <a:extLst>
-              <a:ext uri="{FF2B5EF4-FFF2-40B4-BE49-F238E27FC236}">
-                <a16:creationId xmlns:a16="http://schemas.microsoft.com/office/drawing/2014/main" id="{6AB9A89C-6B11-E498-E082-3C607D6CADF4}"/>
-              </a:ext>
-            </a:extLst>
-          </p:cNvPr>
+          <p:cNvPr id="3" name="Text Placeholder 2"/>
           <p:cNvSpPr>
             <a:spLocks noGrp="1"/>
           </p:cNvSpPr>
@@ -4227,8 +4109,8 @@
         </p:nvSpPr>
         <p:spPr>
           <a:xfrm>
-            <a:off x="831850" y="4589463"/>
-            <a:ext cx="10515600" cy="1500187"/>
+            <a:off x="623888" y="4589464"/>
+            <a:ext cx="7886700" cy="1500187"/>
           </a:xfrm>
         </p:spPr>
         <p:txBody>
@@ -4238,9 +4120,7 @@
               <a:buNone/>
               <a:defRPr sz="2400">
                 <a:solidFill>
-                  <a:schemeClr val="tx1">
-                    <a:tint val="75000"/>
-                  </a:schemeClr>
+                  <a:schemeClr val="tx1"/>
                 </a:solidFill>
               </a:defRPr>
             </a:lvl1pPr>
@@ -4336,13 +4216,7 @@
       </p:sp>
       <p:sp>
         <p:nvSpPr>
-          <p:cNvPr id="4" name="Date Placeholder 3">
-            <a:extLst>
-              <a:ext uri="{FF2B5EF4-FFF2-40B4-BE49-F238E27FC236}">
-                <a16:creationId xmlns:a16="http://schemas.microsoft.com/office/drawing/2014/main" id="{76BC2F2C-2CC9-7085-7E11-98FE6B0B5647}"/>
-              </a:ext>
-            </a:extLst>
-          </p:cNvPr>
+          <p:cNvPr id="4" name="Date Placeholder 3"/>
           <p:cNvSpPr>
             <a:spLocks noGrp="1"/>
           </p:cNvSpPr>
@@ -4357,7 +4231,7 @@
           <a:p>
             <a:fld id="{8F18092E-BB42-4CB3-BFC1-7684CC8B4702}" type="datetimeFigureOut">
               <a:rPr lang="en-US" smtClean="0"/>
-              <a:t>1/6/2023</a:t>
+              <a:t>1/12/2023</a:t>
             </a:fld>
             <a:endParaRPr lang="en-US"/>
           </a:p>
@@ -4365,13 +4239,7 @@
       </p:sp>
       <p:sp>
         <p:nvSpPr>
-          <p:cNvPr id="5" name="Footer Placeholder 4">
-            <a:extLst>
-              <a:ext uri="{FF2B5EF4-FFF2-40B4-BE49-F238E27FC236}">
-                <a16:creationId xmlns:a16="http://schemas.microsoft.com/office/drawing/2014/main" id="{3A3C8EE7-7EDF-19E6-C936-224DDD6B891E}"/>
-              </a:ext>
-            </a:extLst>
-          </p:cNvPr>
+          <p:cNvPr id="5" name="Footer Placeholder 4"/>
           <p:cNvSpPr>
             <a:spLocks noGrp="1"/>
           </p:cNvSpPr>
@@ -4390,13 +4258,7 @@
       </p:sp>
       <p:sp>
         <p:nvSpPr>
-          <p:cNvPr id="6" name="Slide Number Placeholder 5">
-            <a:extLst>
-              <a:ext uri="{FF2B5EF4-FFF2-40B4-BE49-F238E27FC236}">
-                <a16:creationId xmlns:a16="http://schemas.microsoft.com/office/drawing/2014/main" id="{B9E03905-A075-E5BE-C6A4-EDA088846EDA}"/>
-              </a:ext>
-            </a:extLst>
-          </p:cNvPr>
+          <p:cNvPr id="6" name="Slide Number Placeholder 5"/>
           <p:cNvSpPr>
             <a:spLocks noGrp="1"/>
           </p:cNvSpPr>
@@ -4420,7 +4282,7 @@
     </p:spTree>
     <p:extLst>
       <p:ext uri="{BB962C8B-B14F-4D97-AF65-F5344CB8AC3E}">
-        <p14:creationId xmlns:p14="http://schemas.microsoft.com/office/powerpoint/2010/main" val="476579002"/>
+        <p14:creationId xmlns:p14="http://schemas.microsoft.com/office/powerpoint/2010/main" val="427112972"/>
       </p:ext>
     </p:extLst>
   </p:cSld>
@@ -4449,13 +4311,7 @@
       </p:grpSpPr>
       <p:sp>
         <p:nvSpPr>
-          <p:cNvPr id="2" name="Title 1">
-            <a:extLst>
-              <a:ext uri="{FF2B5EF4-FFF2-40B4-BE49-F238E27FC236}">
-                <a16:creationId xmlns:a16="http://schemas.microsoft.com/office/drawing/2014/main" id="{33883F2D-F606-0B3E-2422-0063952E5F40}"/>
-              </a:ext>
-            </a:extLst>
-          </p:cNvPr>
+          <p:cNvPr id="2" name="Title 1"/>
           <p:cNvSpPr>
             <a:spLocks noGrp="1"/>
           </p:cNvSpPr>
@@ -4472,18 +4328,13 @@
               <a:rPr lang="en-US"/>
               <a:t>Click to edit Master title style</a:t>
             </a:r>
+            <a:endParaRPr lang="en-US" dirty="0"/>
           </a:p>
         </p:txBody>
       </p:sp>
       <p:sp>
         <p:nvSpPr>
-          <p:cNvPr id="3" name="Content Placeholder 2">
-            <a:extLst>
-              <a:ext uri="{FF2B5EF4-FFF2-40B4-BE49-F238E27FC236}">
-                <a16:creationId xmlns:a16="http://schemas.microsoft.com/office/drawing/2014/main" id="{ADF94B3F-055B-808F-EA6E-9EA7A86B5077}"/>
-              </a:ext>
-            </a:extLst>
-          </p:cNvPr>
+          <p:cNvPr id="3" name="Content Placeholder 2"/>
           <p:cNvSpPr>
             <a:spLocks noGrp="1"/>
           </p:cNvSpPr>
@@ -4493,8 +4344,8 @@
         </p:nvSpPr>
         <p:spPr>
           <a:xfrm>
-            <a:off x="838200" y="1825625"/>
-            <a:ext cx="5181600" cy="4351338"/>
+            <a:off x="628650" y="1825625"/>
+            <a:ext cx="3886200" cy="4351338"/>
           </a:xfrm>
         </p:spPr>
         <p:txBody>
@@ -4534,18 +4385,13 @@
               <a:rPr lang="en-US"/>
               <a:t>Fifth level</a:t>
             </a:r>
+            <a:endParaRPr lang="en-US" dirty="0"/>
           </a:p>
         </p:txBody>
       </p:sp>
       <p:sp>
         <p:nvSpPr>
-          <p:cNvPr id="4" name="Content Placeholder 3">
-            <a:extLst>
-              <a:ext uri="{FF2B5EF4-FFF2-40B4-BE49-F238E27FC236}">
-                <a16:creationId xmlns:a16="http://schemas.microsoft.com/office/drawing/2014/main" id="{2EE5E2A0-8477-CCA0-6FD2-831197ACBFF4}"/>
-              </a:ext>
-            </a:extLst>
-          </p:cNvPr>
+          <p:cNvPr id="4" name="Content Placeholder 3"/>
           <p:cNvSpPr>
             <a:spLocks noGrp="1"/>
           </p:cNvSpPr>
@@ -4555,8 +4401,8 @@
         </p:nvSpPr>
         <p:spPr>
           <a:xfrm>
-            <a:off x="6172200" y="1825625"/>
-            <a:ext cx="5181600" cy="4351338"/>
+            <a:off x="4629150" y="1825625"/>
+            <a:ext cx="3886200" cy="4351338"/>
           </a:xfrm>
         </p:spPr>
         <p:txBody>
@@ -4596,18 +4442,13 @@
               <a:rPr lang="en-US"/>
               <a:t>Fifth level</a:t>
             </a:r>
+            <a:endParaRPr lang="en-US" dirty="0"/>
           </a:p>
         </p:txBody>
       </p:sp>
       <p:sp>
         <p:nvSpPr>
-          <p:cNvPr id="5" name="Date Placeholder 4">
-            <a:extLst>
-              <a:ext uri="{FF2B5EF4-FFF2-40B4-BE49-F238E27FC236}">
-                <a16:creationId xmlns:a16="http://schemas.microsoft.com/office/drawing/2014/main" id="{6FD435BA-6583-13D2-A1F9-169E93CB6863}"/>
-              </a:ext>
-            </a:extLst>
-          </p:cNvPr>
+          <p:cNvPr id="5" name="Date Placeholder 4"/>
           <p:cNvSpPr>
             <a:spLocks noGrp="1"/>
           </p:cNvSpPr>
@@ -4622,7 +4463,7 @@
           <a:p>
             <a:fld id="{8F18092E-BB42-4CB3-BFC1-7684CC8B4702}" type="datetimeFigureOut">
               <a:rPr lang="en-US" smtClean="0"/>
-              <a:t>1/6/2023</a:t>
+              <a:t>1/12/2023</a:t>
             </a:fld>
             <a:endParaRPr lang="en-US"/>
           </a:p>
@@ -4630,13 +4471,7 @@
       </p:sp>
       <p:sp>
         <p:nvSpPr>
-          <p:cNvPr id="6" name="Footer Placeholder 5">
-            <a:extLst>
-              <a:ext uri="{FF2B5EF4-FFF2-40B4-BE49-F238E27FC236}">
-                <a16:creationId xmlns:a16="http://schemas.microsoft.com/office/drawing/2014/main" id="{141D1EDD-55F6-2090-A381-5ED0E62D90E1}"/>
-              </a:ext>
-            </a:extLst>
-          </p:cNvPr>
+          <p:cNvPr id="6" name="Footer Placeholder 5"/>
           <p:cNvSpPr>
             <a:spLocks noGrp="1"/>
           </p:cNvSpPr>
@@ -4655,13 +4490,7 @@
       </p:sp>
       <p:sp>
         <p:nvSpPr>
-          <p:cNvPr id="7" name="Slide Number Placeholder 6">
-            <a:extLst>
-              <a:ext uri="{FF2B5EF4-FFF2-40B4-BE49-F238E27FC236}">
-                <a16:creationId xmlns:a16="http://schemas.microsoft.com/office/drawing/2014/main" id="{35E4A3CD-B223-8217-98D3-13C10E0E5C45}"/>
-              </a:ext>
-            </a:extLst>
-          </p:cNvPr>
+          <p:cNvPr id="7" name="Slide Number Placeholder 6"/>
           <p:cNvSpPr>
             <a:spLocks noGrp="1"/>
           </p:cNvSpPr>
@@ -4685,7 +4514,7 @@
     </p:spTree>
     <p:extLst>
       <p:ext uri="{BB962C8B-B14F-4D97-AF65-F5344CB8AC3E}">
-        <p14:creationId xmlns:p14="http://schemas.microsoft.com/office/powerpoint/2010/main" val="1469690186"/>
+        <p14:creationId xmlns:p14="http://schemas.microsoft.com/office/powerpoint/2010/main" val="2268346545"/>
       </p:ext>
     </p:extLst>
   </p:cSld>
@@ -4714,13 +4543,7 @@
       </p:grpSpPr>
       <p:sp>
         <p:nvSpPr>
-          <p:cNvPr id="2" name="Title 1">
-            <a:extLst>
-              <a:ext uri="{FF2B5EF4-FFF2-40B4-BE49-F238E27FC236}">
-                <a16:creationId xmlns:a16="http://schemas.microsoft.com/office/drawing/2014/main" id="{4B733F71-F977-D04B-4936-7F2E280C5DF8}"/>
-              </a:ext>
-            </a:extLst>
-          </p:cNvPr>
+          <p:cNvPr id="2" name="Title 1"/>
           <p:cNvSpPr>
             <a:spLocks noGrp="1"/>
           </p:cNvSpPr>
@@ -4730,8 +4553,8 @@
         </p:nvSpPr>
         <p:spPr>
           <a:xfrm>
-            <a:off x="839788" y="365125"/>
-            <a:ext cx="10515600" cy="1325563"/>
+            <a:off x="629841" y="365126"/>
+            <a:ext cx="7886700" cy="1325563"/>
           </a:xfrm>
         </p:spPr>
         <p:txBody>
@@ -4742,18 +4565,13 @@
               <a:rPr lang="en-US"/>
               <a:t>Click to edit Master title style</a:t>
             </a:r>
+            <a:endParaRPr lang="en-US" dirty="0"/>
           </a:p>
         </p:txBody>
       </p:sp>
       <p:sp>
         <p:nvSpPr>
-          <p:cNvPr id="3" name="Text Placeholder 2">
-            <a:extLst>
-              <a:ext uri="{FF2B5EF4-FFF2-40B4-BE49-F238E27FC236}">
-                <a16:creationId xmlns:a16="http://schemas.microsoft.com/office/drawing/2014/main" id="{F9E7A698-DB82-D7E2-792B-C70ADD51B535}"/>
-              </a:ext>
-            </a:extLst>
-          </p:cNvPr>
+          <p:cNvPr id="3" name="Text Placeholder 2"/>
           <p:cNvSpPr>
             <a:spLocks noGrp="1"/>
           </p:cNvSpPr>
@@ -4763,8 +4581,8 @@
         </p:nvSpPr>
         <p:spPr>
           <a:xfrm>
-            <a:off x="839788" y="1681163"/>
-            <a:ext cx="5157787" cy="823912"/>
+            <a:off x="629842" y="1681163"/>
+            <a:ext cx="3868340" cy="823912"/>
           </a:xfrm>
         </p:spPr>
         <p:txBody>
@@ -4818,13 +4636,7 @@
       </p:sp>
       <p:sp>
         <p:nvSpPr>
-          <p:cNvPr id="4" name="Content Placeholder 3">
-            <a:extLst>
-              <a:ext uri="{FF2B5EF4-FFF2-40B4-BE49-F238E27FC236}">
-                <a16:creationId xmlns:a16="http://schemas.microsoft.com/office/drawing/2014/main" id="{624C2B76-59EB-3CF8-6682-CA86FAE6A5B6}"/>
-              </a:ext>
-            </a:extLst>
-          </p:cNvPr>
+          <p:cNvPr id="4" name="Content Placeholder 3"/>
           <p:cNvSpPr>
             <a:spLocks noGrp="1"/>
           </p:cNvSpPr>
@@ -4834,8 +4646,8 @@
         </p:nvSpPr>
         <p:spPr>
           <a:xfrm>
-            <a:off x="839788" y="2505075"/>
-            <a:ext cx="5157787" cy="3684588"/>
+            <a:off x="629842" y="2505075"/>
+            <a:ext cx="3868340" cy="3684588"/>
           </a:xfrm>
         </p:spPr>
         <p:txBody>
@@ -4875,18 +4687,13 @@
               <a:rPr lang="en-US"/>
               <a:t>Fifth level</a:t>
             </a:r>
+            <a:endParaRPr lang="en-US" dirty="0"/>
           </a:p>
         </p:txBody>
       </p:sp>
       <p:sp>
         <p:nvSpPr>
-          <p:cNvPr id="5" name="Text Placeholder 4">
-            <a:extLst>
-              <a:ext uri="{FF2B5EF4-FFF2-40B4-BE49-F238E27FC236}">
-                <a16:creationId xmlns:a16="http://schemas.microsoft.com/office/drawing/2014/main" id="{82C2FF48-DCDB-10E0-D595-9BF4FBA1399B}"/>
-              </a:ext>
-            </a:extLst>
-          </p:cNvPr>
+          <p:cNvPr id="5" name="Text Placeholder 4"/>
           <p:cNvSpPr>
             <a:spLocks noGrp="1"/>
           </p:cNvSpPr>
@@ -4896,8 +4703,8 @@
         </p:nvSpPr>
         <p:spPr>
           <a:xfrm>
-            <a:off x="6172200" y="1681163"/>
-            <a:ext cx="5183188" cy="823912"/>
+            <a:off x="4629150" y="1681163"/>
+            <a:ext cx="3887391" cy="823912"/>
           </a:xfrm>
         </p:spPr>
         <p:txBody>
@@ -4951,13 +4758,7 @@
       </p:sp>
       <p:sp>
         <p:nvSpPr>
-          <p:cNvPr id="6" name="Content Placeholder 5">
-            <a:extLst>
-              <a:ext uri="{FF2B5EF4-FFF2-40B4-BE49-F238E27FC236}">
-                <a16:creationId xmlns:a16="http://schemas.microsoft.com/office/drawing/2014/main" id="{D7CA75CE-6D82-2975-1A79-C3D2C42C04DA}"/>
-              </a:ext>
-            </a:extLst>
-          </p:cNvPr>
+          <p:cNvPr id="6" name="Content Placeholder 5"/>
           <p:cNvSpPr>
             <a:spLocks noGrp="1"/>
           </p:cNvSpPr>
@@ -4967,8 +4768,8 @@
         </p:nvSpPr>
         <p:spPr>
           <a:xfrm>
-            <a:off x="6172200" y="2505075"/>
-            <a:ext cx="5183188" cy="3684588"/>
+            <a:off x="4629150" y="2505075"/>
+            <a:ext cx="3887391" cy="3684588"/>
           </a:xfrm>
         </p:spPr>
         <p:txBody>
@@ -5008,18 +4809,13 @@
               <a:rPr lang="en-US"/>
               <a:t>Fifth level</a:t>
             </a:r>
+            <a:endParaRPr lang="en-US" dirty="0"/>
           </a:p>
         </p:txBody>
       </p:sp>
       <p:sp>
         <p:nvSpPr>
-          <p:cNvPr id="7" name="Date Placeholder 6">
-            <a:extLst>
-              <a:ext uri="{FF2B5EF4-FFF2-40B4-BE49-F238E27FC236}">
-                <a16:creationId xmlns:a16="http://schemas.microsoft.com/office/drawing/2014/main" id="{181041F3-C448-C9AC-53F0-130A2FAC8EF8}"/>
-              </a:ext>
-            </a:extLst>
-          </p:cNvPr>
+          <p:cNvPr id="7" name="Date Placeholder 6"/>
           <p:cNvSpPr>
             <a:spLocks noGrp="1"/>
           </p:cNvSpPr>
@@ -5034,7 +4830,7 @@
           <a:p>
             <a:fld id="{8F18092E-BB42-4CB3-BFC1-7684CC8B4702}" type="datetimeFigureOut">
               <a:rPr lang="en-US" smtClean="0"/>
-              <a:t>1/6/2023</a:t>
+              <a:t>1/12/2023</a:t>
             </a:fld>
             <a:endParaRPr lang="en-US"/>
           </a:p>
@@ -5042,13 +4838,7 @@
       </p:sp>
       <p:sp>
         <p:nvSpPr>
-          <p:cNvPr id="8" name="Footer Placeholder 7">
-            <a:extLst>
-              <a:ext uri="{FF2B5EF4-FFF2-40B4-BE49-F238E27FC236}">
-                <a16:creationId xmlns:a16="http://schemas.microsoft.com/office/drawing/2014/main" id="{05D746C6-E384-54C0-8C0C-1DC0F67E2A93}"/>
-              </a:ext>
-            </a:extLst>
-          </p:cNvPr>
+          <p:cNvPr id="8" name="Footer Placeholder 7"/>
           <p:cNvSpPr>
             <a:spLocks noGrp="1"/>
           </p:cNvSpPr>
@@ -5067,13 +4857,7 @@
       </p:sp>
       <p:sp>
         <p:nvSpPr>
-          <p:cNvPr id="9" name="Slide Number Placeholder 8">
-            <a:extLst>
-              <a:ext uri="{FF2B5EF4-FFF2-40B4-BE49-F238E27FC236}">
-                <a16:creationId xmlns:a16="http://schemas.microsoft.com/office/drawing/2014/main" id="{22325318-9B97-85B8-9C54-52546EC26EB4}"/>
-              </a:ext>
-            </a:extLst>
-          </p:cNvPr>
+          <p:cNvPr id="9" name="Slide Number Placeholder 8"/>
           <p:cNvSpPr>
             <a:spLocks noGrp="1"/>
           </p:cNvSpPr>
@@ -5097,7 +4881,7 @@
     </p:spTree>
     <p:extLst>
       <p:ext uri="{BB962C8B-B14F-4D97-AF65-F5344CB8AC3E}">
-        <p14:creationId xmlns:p14="http://schemas.microsoft.com/office/powerpoint/2010/main" val="2275775213"/>
+        <p14:creationId xmlns:p14="http://schemas.microsoft.com/office/powerpoint/2010/main" val="1756795178"/>
       </p:ext>
     </p:extLst>
   </p:cSld>
@@ -5126,13 +4910,7 @@
       </p:grpSpPr>
       <p:sp>
         <p:nvSpPr>
-          <p:cNvPr id="2" name="Title 1">
-            <a:extLst>
-              <a:ext uri="{FF2B5EF4-FFF2-40B4-BE49-F238E27FC236}">
-                <a16:creationId xmlns:a16="http://schemas.microsoft.com/office/drawing/2014/main" id="{326895BF-DF6D-74F9-C663-2AA46D14A5FB}"/>
-              </a:ext>
-            </a:extLst>
-          </p:cNvPr>
+          <p:cNvPr id="2" name="Title 1"/>
           <p:cNvSpPr>
             <a:spLocks noGrp="1"/>
           </p:cNvSpPr>
@@ -5149,18 +4927,13 @@
               <a:rPr lang="en-US"/>
               <a:t>Click to edit Master title style</a:t>
             </a:r>
+            <a:endParaRPr lang="en-US" dirty="0"/>
           </a:p>
         </p:txBody>
       </p:sp>
       <p:sp>
         <p:nvSpPr>
-          <p:cNvPr id="3" name="Date Placeholder 2">
-            <a:extLst>
-              <a:ext uri="{FF2B5EF4-FFF2-40B4-BE49-F238E27FC236}">
-                <a16:creationId xmlns:a16="http://schemas.microsoft.com/office/drawing/2014/main" id="{3B1962A8-4E11-6641-6D7E-7989AB2C31A9}"/>
-              </a:ext>
-            </a:extLst>
-          </p:cNvPr>
+          <p:cNvPr id="3" name="Date Placeholder 2"/>
           <p:cNvSpPr>
             <a:spLocks noGrp="1"/>
           </p:cNvSpPr>
@@ -5175,7 +4948,7 @@
           <a:p>
             <a:fld id="{8F18092E-BB42-4CB3-BFC1-7684CC8B4702}" type="datetimeFigureOut">
               <a:rPr lang="en-US" smtClean="0"/>
-              <a:t>1/6/2023</a:t>
+              <a:t>1/12/2023</a:t>
             </a:fld>
             <a:endParaRPr lang="en-US"/>
           </a:p>
@@ -5183,13 +4956,7 @@
       </p:sp>
       <p:sp>
         <p:nvSpPr>
-          <p:cNvPr id="4" name="Footer Placeholder 3">
-            <a:extLst>
-              <a:ext uri="{FF2B5EF4-FFF2-40B4-BE49-F238E27FC236}">
-                <a16:creationId xmlns:a16="http://schemas.microsoft.com/office/drawing/2014/main" id="{558BB0E7-0D70-2E11-FA34-FAB7DD0FD6D7}"/>
-              </a:ext>
-            </a:extLst>
-          </p:cNvPr>
+          <p:cNvPr id="4" name="Footer Placeholder 3"/>
           <p:cNvSpPr>
             <a:spLocks noGrp="1"/>
           </p:cNvSpPr>
@@ -5208,13 +4975,7 @@
       </p:sp>
       <p:sp>
         <p:nvSpPr>
-          <p:cNvPr id="5" name="Slide Number Placeholder 4">
-            <a:extLst>
-              <a:ext uri="{FF2B5EF4-FFF2-40B4-BE49-F238E27FC236}">
-                <a16:creationId xmlns:a16="http://schemas.microsoft.com/office/drawing/2014/main" id="{B0BF16C0-4B9A-59CF-3E1D-AE21736D8177}"/>
-              </a:ext>
-            </a:extLst>
-          </p:cNvPr>
+          <p:cNvPr id="5" name="Slide Number Placeholder 4"/>
           <p:cNvSpPr>
             <a:spLocks noGrp="1"/>
           </p:cNvSpPr>
@@ -5238,7 +4999,7 @@
     </p:spTree>
     <p:extLst>
       <p:ext uri="{BB962C8B-B14F-4D97-AF65-F5344CB8AC3E}">
-        <p14:creationId xmlns:p14="http://schemas.microsoft.com/office/powerpoint/2010/main" val="3336737789"/>
+        <p14:creationId xmlns:p14="http://schemas.microsoft.com/office/powerpoint/2010/main" val="4014047274"/>
       </p:ext>
     </p:extLst>
   </p:cSld>
@@ -5267,13 +5028,7 @@
       </p:grpSpPr>
       <p:sp>
         <p:nvSpPr>
-          <p:cNvPr id="2" name="Date Placeholder 1">
-            <a:extLst>
-              <a:ext uri="{FF2B5EF4-FFF2-40B4-BE49-F238E27FC236}">
-                <a16:creationId xmlns:a16="http://schemas.microsoft.com/office/drawing/2014/main" id="{8A8C8331-AE68-A938-B887-D3732260CDA3}"/>
-              </a:ext>
-            </a:extLst>
-          </p:cNvPr>
+          <p:cNvPr id="2" name="Date Placeholder 1"/>
           <p:cNvSpPr>
             <a:spLocks noGrp="1"/>
           </p:cNvSpPr>
@@ -5288,7 +5043,7 @@
           <a:p>
             <a:fld id="{8F18092E-BB42-4CB3-BFC1-7684CC8B4702}" type="datetimeFigureOut">
               <a:rPr lang="en-US" smtClean="0"/>
-              <a:t>1/6/2023</a:t>
+              <a:t>1/12/2023</a:t>
             </a:fld>
             <a:endParaRPr lang="en-US"/>
           </a:p>
@@ -5296,13 +5051,7 @@
       </p:sp>
       <p:sp>
         <p:nvSpPr>
-          <p:cNvPr id="3" name="Footer Placeholder 2">
-            <a:extLst>
-              <a:ext uri="{FF2B5EF4-FFF2-40B4-BE49-F238E27FC236}">
-                <a16:creationId xmlns:a16="http://schemas.microsoft.com/office/drawing/2014/main" id="{51A8BA06-A062-886D-8C70-55E5CCA0D229}"/>
-              </a:ext>
-            </a:extLst>
-          </p:cNvPr>
+          <p:cNvPr id="3" name="Footer Placeholder 2"/>
           <p:cNvSpPr>
             <a:spLocks noGrp="1"/>
           </p:cNvSpPr>
@@ -5321,13 +5070,7 @@
       </p:sp>
       <p:sp>
         <p:nvSpPr>
-          <p:cNvPr id="4" name="Slide Number Placeholder 3">
-            <a:extLst>
-              <a:ext uri="{FF2B5EF4-FFF2-40B4-BE49-F238E27FC236}">
-                <a16:creationId xmlns:a16="http://schemas.microsoft.com/office/drawing/2014/main" id="{EC256BE6-492E-A509-F2AF-C7634F20168E}"/>
-              </a:ext>
-            </a:extLst>
-          </p:cNvPr>
+          <p:cNvPr id="4" name="Slide Number Placeholder 3"/>
           <p:cNvSpPr>
             <a:spLocks noGrp="1"/>
           </p:cNvSpPr>
@@ -5351,7 +5094,7 @@
     </p:spTree>
     <p:extLst>
       <p:ext uri="{BB962C8B-B14F-4D97-AF65-F5344CB8AC3E}">
-        <p14:creationId xmlns:p14="http://schemas.microsoft.com/office/powerpoint/2010/main" val="1987019928"/>
+        <p14:creationId xmlns:p14="http://schemas.microsoft.com/office/powerpoint/2010/main" val="3046184849"/>
       </p:ext>
     </p:extLst>
   </p:cSld>
@@ -5380,13 +5123,7 @@
       </p:grpSpPr>
       <p:sp>
         <p:nvSpPr>
-          <p:cNvPr id="2" name="Title 1">
-            <a:extLst>
-              <a:ext uri="{FF2B5EF4-FFF2-40B4-BE49-F238E27FC236}">
-                <a16:creationId xmlns:a16="http://schemas.microsoft.com/office/drawing/2014/main" id="{94340C36-A4AF-3AD7-2FA6-10D3B98B549E}"/>
-              </a:ext>
-            </a:extLst>
-          </p:cNvPr>
+          <p:cNvPr id="2" name="Title 1"/>
           <p:cNvSpPr>
             <a:spLocks noGrp="1"/>
           </p:cNvSpPr>
@@ -5396,8 +5133,8 @@
         </p:nvSpPr>
         <p:spPr>
           <a:xfrm>
-            <a:off x="839788" y="457200"/>
-            <a:ext cx="3932237" cy="1600200"/>
+            <a:off x="629841" y="457200"/>
+            <a:ext cx="2949178" cy="1600200"/>
           </a:xfrm>
         </p:spPr>
         <p:txBody>
@@ -5412,18 +5149,13 @@
               <a:rPr lang="en-US"/>
               <a:t>Click to edit Master title style</a:t>
             </a:r>
+            <a:endParaRPr lang="en-US" dirty="0"/>
           </a:p>
         </p:txBody>
       </p:sp>
       <p:sp>
         <p:nvSpPr>
-          <p:cNvPr id="3" name="Content Placeholder 2">
-            <a:extLst>
-              <a:ext uri="{FF2B5EF4-FFF2-40B4-BE49-F238E27FC236}">
-                <a16:creationId xmlns:a16="http://schemas.microsoft.com/office/drawing/2014/main" id="{8879F42D-F323-88F3-C7E9-7AD3FA2544A9}"/>
-              </a:ext>
-            </a:extLst>
-          </p:cNvPr>
+          <p:cNvPr id="3" name="Content Placeholder 2"/>
           <p:cNvSpPr>
             <a:spLocks noGrp="1"/>
           </p:cNvSpPr>
@@ -5433,8 +5165,8 @@
         </p:nvSpPr>
         <p:spPr>
           <a:xfrm>
-            <a:off x="5183188" y="987425"/>
-            <a:ext cx="6172200" cy="4873625"/>
+            <a:off x="3887391" y="987426"/>
+            <a:ext cx="4629150" cy="4873625"/>
           </a:xfrm>
         </p:spPr>
         <p:txBody>
@@ -5502,18 +5234,13 @@
               <a:rPr lang="en-US"/>
               <a:t>Fifth level</a:t>
             </a:r>
+            <a:endParaRPr lang="en-US" dirty="0"/>
           </a:p>
         </p:txBody>
       </p:sp>
       <p:sp>
         <p:nvSpPr>
-          <p:cNvPr id="4" name="Text Placeholder 3">
-            <a:extLst>
-              <a:ext uri="{FF2B5EF4-FFF2-40B4-BE49-F238E27FC236}">
-                <a16:creationId xmlns:a16="http://schemas.microsoft.com/office/drawing/2014/main" id="{B02014E4-A246-730A-A323-3B057DBAA7FB}"/>
-              </a:ext>
-            </a:extLst>
-          </p:cNvPr>
+          <p:cNvPr id="4" name="Text Placeholder 3"/>
           <p:cNvSpPr>
             <a:spLocks noGrp="1"/>
           </p:cNvSpPr>
@@ -5523,8 +5250,8 @@
         </p:nvSpPr>
         <p:spPr>
           <a:xfrm>
-            <a:off x="839788" y="2057400"/>
-            <a:ext cx="3932237" cy="3811588"/>
+            <a:off x="629841" y="2057400"/>
+            <a:ext cx="2949178" cy="3811588"/>
           </a:xfrm>
         </p:spPr>
         <p:txBody>
@@ -5578,13 +5305,7 @@
       </p:sp>
       <p:sp>
         <p:nvSpPr>
-          <p:cNvPr id="5" name="Date Placeholder 4">
-            <a:extLst>
-              <a:ext uri="{FF2B5EF4-FFF2-40B4-BE49-F238E27FC236}">
-                <a16:creationId xmlns:a16="http://schemas.microsoft.com/office/drawing/2014/main" id="{BB37BCD2-B619-0123-0888-1C5F8A5EEEC9}"/>
-              </a:ext>
-            </a:extLst>
-          </p:cNvPr>
+          <p:cNvPr id="5" name="Date Placeholder 4"/>
           <p:cNvSpPr>
             <a:spLocks noGrp="1"/>
           </p:cNvSpPr>
@@ -5599,7 +5320,7 @@
           <a:p>
             <a:fld id="{8F18092E-BB42-4CB3-BFC1-7684CC8B4702}" type="datetimeFigureOut">
               <a:rPr lang="en-US" smtClean="0"/>
-              <a:t>1/6/2023</a:t>
+              <a:t>1/12/2023</a:t>
             </a:fld>
             <a:endParaRPr lang="en-US"/>
           </a:p>
@@ -5607,13 +5328,7 @@
       </p:sp>
       <p:sp>
         <p:nvSpPr>
-          <p:cNvPr id="6" name="Footer Placeholder 5">
-            <a:extLst>
-              <a:ext uri="{FF2B5EF4-FFF2-40B4-BE49-F238E27FC236}">
-                <a16:creationId xmlns:a16="http://schemas.microsoft.com/office/drawing/2014/main" id="{44097D88-1C7C-4277-1C30-9A11FEEE67FF}"/>
-              </a:ext>
-            </a:extLst>
-          </p:cNvPr>
+          <p:cNvPr id="6" name="Footer Placeholder 5"/>
           <p:cNvSpPr>
             <a:spLocks noGrp="1"/>
           </p:cNvSpPr>
@@ -5632,13 +5347,7 @@
       </p:sp>
       <p:sp>
         <p:nvSpPr>
-          <p:cNvPr id="7" name="Slide Number Placeholder 6">
-            <a:extLst>
-              <a:ext uri="{FF2B5EF4-FFF2-40B4-BE49-F238E27FC236}">
-                <a16:creationId xmlns:a16="http://schemas.microsoft.com/office/drawing/2014/main" id="{9D07269F-4CB8-44A8-B76A-124981E697C1}"/>
-              </a:ext>
-            </a:extLst>
-          </p:cNvPr>
+          <p:cNvPr id="7" name="Slide Number Placeholder 6"/>
           <p:cNvSpPr>
             <a:spLocks noGrp="1"/>
           </p:cNvSpPr>
@@ -5662,7 +5371,7 @@
     </p:spTree>
     <p:extLst>
       <p:ext uri="{BB962C8B-B14F-4D97-AF65-F5344CB8AC3E}">
-        <p14:creationId xmlns:p14="http://schemas.microsoft.com/office/powerpoint/2010/main" val="740068601"/>
+        <p14:creationId xmlns:p14="http://schemas.microsoft.com/office/powerpoint/2010/main" val="1560144952"/>
       </p:ext>
     </p:extLst>
   </p:cSld>
@@ -5691,13 +5400,7 @@
       </p:grpSpPr>
       <p:sp>
         <p:nvSpPr>
-          <p:cNvPr id="2" name="Title 1">
-            <a:extLst>
-              <a:ext uri="{FF2B5EF4-FFF2-40B4-BE49-F238E27FC236}">
-                <a16:creationId xmlns:a16="http://schemas.microsoft.com/office/drawing/2014/main" id="{46F82FA0-2C23-B1E2-B819-1B97B8F4BDD4}"/>
-              </a:ext>
-            </a:extLst>
-          </p:cNvPr>
+          <p:cNvPr id="2" name="Title 1"/>
           <p:cNvSpPr>
             <a:spLocks noGrp="1"/>
           </p:cNvSpPr>
@@ -5707,8 +5410,8 @@
         </p:nvSpPr>
         <p:spPr>
           <a:xfrm>
-            <a:off x="839788" y="457200"/>
-            <a:ext cx="3932237" cy="1600200"/>
+            <a:off x="629841" y="457200"/>
+            <a:ext cx="2949178" cy="1600200"/>
           </a:xfrm>
         </p:spPr>
         <p:txBody>
@@ -5723,20 +5426,15 @@
               <a:rPr lang="en-US"/>
               <a:t>Click to edit Master title style</a:t>
             </a:r>
+            <a:endParaRPr lang="en-US" dirty="0"/>
           </a:p>
         </p:txBody>
       </p:sp>
       <p:sp>
         <p:nvSpPr>
-          <p:cNvPr id="3" name="Picture Placeholder 2">
-            <a:extLst>
-              <a:ext uri="{FF2B5EF4-FFF2-40B4-BE49-F238E27FC236}">
-                <a16:creationId xmlns:a16="http://schemas.microsoft.com/office/drawing/2014/main" id="{FC266F16-3602-48FE-CB52-FA72D0A862AA}"/>
-              </a:ext>
-            </a:extLst>
-          </p:cNvPr>
+          <p:cNvPr id="3" name="Picture Placeholder 2"/>
           <p:cNvSpPr>
-            <a:spLocks noGrp="1"/>
+            <a:spLocks noGrp="1" noChangeAspect="1"/>
           </p:cNvSpPr>
           <p:nvPr>
             <p:ph type="pic" idx="1"/>
@@ -5744,12 +5442,12 @@
         </p:nvSpPr>
         <p:spPr>
           <a:xfrm>
-            <a:off x="5183188" y="987425"/>
-            <a:ext cx="6172200" cy="4873625"/>
+            <a:off x="3887391" y="987426"/>
+            <a:ext cx="4629150" cy="4873625"/>
           </a:xfrm>
         </p:spPr>
         <p:txBody>
-          <a:bodyPr/>
+          <a:bodyPr anchor="t"/>
           <a:lstStyle>
             <a:lvl1pPr marL="0" indent="0">
               <a:buNone/>
@@ -5789,19 +5487,17 @@
             </a:lvl9pPr>
           </a:lstStyle>
           <a:p>
-            <a:endParaRPr lang="en-US"/>
+            <a:r>
+              <a:rPr lang="en-US"/>
+              <a:t>Click icon to add picture</a:t>
+            </a:r>
+            <a:endParaRPr lang="en-US" dirty="0"/>
           </a:p>
         </p:txBody>
       </p:sp>
       <p:sp>
         <p:nvSpPr>
-          <p:cNvPr id="4" name="Text Placeholder 3">
-            <a:extLst>
-              <a:ext uri="{FF2B5EF4-FFF2-40B4-BE49-F238E27FC236}">
-                <a16:creationId xmlns:a16="http://schemas.microsoft.com/office/drawing/2014/main" id="{759B7799-3F0F-1BD1-5E4D-322A4EF6FB26}"/>
-              </a:ext>
-            </a:extLst>
-          </p:cNvPr>
+          <p:cNvPr id="4" name="Text Placeholder 3"/>
           <p:cNvSpPr>
             <a:spLocks noGrp="1"/>
           </p:cNvSpPr>
@@ -5811,8 +5507,8 @@
         </p:nvSpPr>
         <p:spPr>
           <a:xfrm>
-            <a:off x="839788" y="2057400"/>
-            <a:ext cx="3932237" cy="3811588"/>
+            <a:off x="629841" y="2057400"/>
+            <a:ext cx="2949178" cy="3811588"/>
           </a:xfrm>
         </p:spPr>
         <p:txBody>
@@ -5866,13 +5562,7 @@
       </p:sp>
       <p:sp>
         <p:nvSpPr>
-          <p:cNvPr id="5" name="Date Placeholder 4">
-            <a:extLst>
-              <a:ext uri="{FF2B5EF4-FFF2-40B4-BE49-F238E27FC236}">
-                <a16:creationId xmlns:a16="http://schemas.microsoft.com/office/drawing/2014/main" id="{35DD67C2-6C69-CDE0-4D88-FE59EE720266}"/>
-              </a:ext>
-            </a:extLst>
-          </p:cNvPr>
+          <p:cNvPr id="5" name="Date Placeholder 4"/>
           <p:cNvSpPr>
             <a:spLocks noGrp="1"/>
           </p:cNvSpPr>
@@ -5887,7 +5577,7 @@
           <a:p>
             <a:fld id="{8F18092E-BB42-4CB3-BFC1-7684CC8B4702}" type="datetimeFigureOut">
               <a:rPr lang="en-US" smtClean="0"/>
-              <a:t>1/6/2023</a:t>
+              <a:t>1/12/2023</a:t>
             </a:fld>
             <a:endParaRPr lang="en-US"/>
           </a:p>
@@ -5895,13 +5585,7 @@
       </p:sp>
       <p:sp>
         <p:nvSpPr>
-          <p:cNvPr id="6" name="Footer Placeholder 5">
-            <a:extLst>
-              <a:ext uri="{FF2B5EF4-FFF2-40B4-BE49-F238E27FC236}">
-                <a16:creationId xmlns:a16="http://schemas.microsoft.com/office/drawing/2014/main" id="{C01AE0FF-0740-A86C-136E-883B4E01F293}"/>
-              </a:ext>
-            </a:extLst>
-          </p:cNvPr>
+          <p:cNvPr id="6" name="Footer Placeholder 5"/>
           <p:cNvSpPr>
             <a:spLocks noGrp="1"/>
           </p:cNvSpPr>
@@ -5920,13 +5604,7 @@
       </p:sp>
       <p:sp>
         <p:nvSpPr>
-          <p:cNvPr id="7" name="Slide Number Placeholder 6">
-            <a:extLst>
-              <a:ext uri="{FF2B5EF4-FFF2-40B4-BE49-F238E27FC236}">
-                <a16:creationId xmlns:a16="http://schemas.microsoft.com/office/drawing/2014/main" id="{DDF20287-70A1-275B-DA7B-03A2122A6709}"/>
-              </a:ext>
-            </a:extLst>
-          </p:cNvPr>
+          <p:cNvPr id="7" name="Slide Number Placeholder 6"/>
           <p:cNvSpPr>
             <a:spLocks noGrp="1"/>
           </p:cNvSpPr>
@@ -5950,7 +5628,7 @@
     </p:spTree>
     <p:extLst>
       <p:ext uri="{BB962C8B-B14F-4D97-AF65-F5344CB8AC3E}">
-        <p14:creationId xmlns:p14="http://schemas.microsoft.com/office/powerpoint/2010/main" val="2373082140"/>
+        <p14:creationId xmlns:p14="http://schemas.microsoft.com/office/powerpoint/2010/main" val="39007861"/>
       </p:ext>
     </p:extLst>
   </p:cSld>
@@ -5984,13 +5662,7 @@
       </p:grpSpPr>
       <p:sp>
         <p:nvSpPr>
-          <p:cNvPr id="2" name="Title Placeholder 1">
-            <a:extLst>
-              <a:ext uri="{FF2B5EF4-FFF2-40B4-BE49-F238E27FC236}">
-                <a16:creationId xmlns:a16="http://schemas.microsoft.com/office/drawing/2014/main" id="{D99B2C5B-6859-9049-1F8C-5847D0C79EF5}"/>
-              </a:ext>
-            </a:extLst>
-          </p:cNvPr>
+          <p:cNvPr id="2" name="Title Placeholder 1"/>
           <p:cNvSpPr>
             <a:spLocks noGrp="1"/>
           </p:cNvSpPr>
@@ -6000,8 +5672,8 @@
         </p:nvSpPr>
         <p:spPr>
           <a:xfrm>
-            <a:off x="838200" y="365125"/>
-            <a:ext cx="10515600" cy="1325563"/>
+            <a:off x="628650" y="365126"/>
+            <a:ext cx="7886700" cy="1325563"/>
           </a:xfrm>
           <a:prstGeom prst="rect">
             <a:avLst/>
@@ -6017,18 +5689,13 @@
               <a:rPr lang="en-US"/>
               <a:t>Click to edit Master title style</a:t>
             </a:r>
+            <a:endParaRPr lang="en-US" dirty="0"/>
           </a:p>
         </p:txBody>
       </p:sp>
       <p:sp>
         <p:nvSpPr>
-          <p:cNvPr id="3" name="Text Placeholder 2">
-            <a:extLst>
-              <a:ext uri="{FF2B5EF4-FFF2-40B4-BE49-F238E27FC236}">
-                <a16:creationId xmlns:a16="http://schemas.microsoft.com/office/drawing/2014/main" id="{862C21C0-B890-2734-95AE-7FB0E753DD33}"/>
-              </a:ext>
-            </a:extLst>
-          </p:cNvPr>
+          <p:cNvPr id="3" name="Text Placeholder 2"/>
           <p:cNvSpPr>
             <a:spLocks noGrp="1"/>
           </p:cNvSpPr>
@@ -6038,8 +5705,8 @@
         </p:nvSpPr>
         <p:spPr>
           <a:xfrm>
-            <a:off x="838200" y="1825625"/>
-            <a:ext cx="10515600" cy="4351338"/>
+            <a:off x="628650" y="1825625"/>
+            <a:ext cx="7886700" cy="4351338"/>
           </a:xfrm>
           <a:prstGeom prst="rect">
             <a:avLst/>
@@ -6084,18 +5751,13 @@
               <a:rPr lang="en-US"/>
               <a:t>Fifth level</a:t>
             </a:r>
+            <a:endParaRPr lang="en-US" dirty="0"/>
           </a:p>
         </p:txBody>
       </p:sp>
       <p:sp>
         <p:nvSpPr>
-          <p:cNvPr id="4" name="Date Placeholder 3">
-            <a:extLst>
-              <a:ext uri="{FF2B5EF4-FFF2-40B4-BE49-F238E27FC236}">
-                <a16:creationId xmlns:a16="http://schemas.microsoft.com/office/drawing/2014/main" id="{AE6D045A-5E0C-021A-9F3B-405BE8F4850D}"/>
-              </a:ext>
-            </a:extLst>
-          </p:cNvPr>
+          <p:cNvPr id="4" name="Date Placeholder 3"/>
           <p:cNvSpPr>
             <a:spLocks noGrp="1"/>
           </p:cNvSpPr>
@@ -6105,8 +5767,8 @@
         </p:nvSpPr>
         <p:spPr>
           <a:xfrm>
-            <a:off x="838200" y="6356350"/>
-            <a:ext cx="2743200" cy="365125"/>
+            <a:off x="628650" y="6356351"/>
+            <a:ext cx="2057400" cy="365125"/>
           </a:xfrm>
           <a:prstGeom prst="rect">
             <a:avLst/>
@@ -6128,7 +5790,7 @@
           <a:p>
             <a:fld id="{8F18092E-BB42-4CB3-BFC1-7684CC8B4702}" type="datetimeFigureOut">
               <a:rPr lang="en-US" smtClean="0"/>
-              <a:t>1/6/2023</a:t>
+              <a:t>1/12/2023</a:t>
             </a:fld>
             <a:endParaRPr lang="en-US"/>
           </a:p>
@@ -6136,13 +5798,7 @@
       </p:sp>
       <p:sp>
         <p:nvSpPr>
-          <p:cNvPr id="5" name="Footer Placeholder 4">
-            <a:extLst>
-              <a:ext uri="{FF2B5EF4-FFF2-40B4-BE49-F238E27FC236}">
-                <a16:creationId xmlns:a16="http://schemas.microsoft.com/office/drawing/2014/main" id="{0D16E032-4A43-315B-4E3D-007203EFC8A2}"/>
-              </a:ext>
-            </a:extLst>
-          </p:cNvPr>
+          <p:cNvPr id="5" name="Footer Placeholder 4"/>
           <p:cNvSpPr>
             <a:spLocks noGrp="1"/>
           </p:cNvSpPr>
@@ -6152,8 +5808,8 @@
         </p:nvSpPr>
         <p:spPr>
           <a:xfrm>
-            <a:off x="4038600" y="6356350"/>
-            <a:ext cx="4114800" cy="365125"/>
+            <a:off x="3028950" y="6356351"/>
+            <a:ext cx="3086100" cy="365125"/>
           </a:xfrm>
           <a:prstGeom prst="rect">
             <a:avLst/>
@@ -6179,13 +5835,7 @@
       </p:sp>
       <p:sp>
         <p:nvSpPr>
-          <p:cNvPr id="6" name="Slide Number Placeholder 5">
-            <a:extLst>
-              <a:ext uri="{FF2B5EF4-FFF2-40B4-BE49-F238E27FC236}">
-                <a16:creationId xmlns:a16="http://schemas.microsoft.com/office/drawing/2014/main" id="{43E12FD0-7382-06FF-6FBF-0D2B510590A3}"/>
-              </a:ext>
-            </a:extLst>
-          </p:cNvPr>
+          <p:cNvPr id="6" name="Slide Number Placeholder 5"/>
           <p:cNvSpPr>
             <a:spLocks noGrp="1"/>
           </p:cNvSpPr>
@@ -6195,8 +5845,8 @@
         </p:nvSpPr>
         <p:spPr>
           <a:xfrm>
-            <a:off x="8610600" y="6356350"/>
-            <a:ext cx="2743200" cy="365125"/>
+            <a:off x="6457950" y="6356351"/>
+            <a:ext cx="2057400" cy="365125"/>
           </a:xfrm>
           <a:prstGeom prst="rect">
             <a:avLst/>
@@ -6227,23 +5877,23 @@
     </p:spTree>
     <p:extLst>
       <p:ext uri="{BB962C8B-B14F-4D97-AF65-F5344CB8AC3E}">
-        <p14:creationId xmlns:p14="http://schemas.microsoft.com/office/powerpoint/2010/main" val="1797556066"/>
+        <p14:creationId xmlns:p14="http://schemas.microsoft.com/office/powerpoint/2010/main" val="2826379216"/>
       </p:ext>
     </p:extLst>
   </p:cSld>
   <p:clrMap bg1="lt1" tx1="dk1" bg2="lt2" tx2="dk2" accent1="accent1" accent2="accent2" accent3="accent3" accent4="accent4" accent5="accent5" accent6="accent6" hlink="hlink" folHlink="folHlink"/>
   <p:sldLayoutIdLst>
-    <p:sldLayoutId id="2147483649" r:id="rId1"/>
-    <p:sldLayoutId id="2147483650" r:id="rId2"/>
-    <p:sldLayoutId id="2147483651" r:id="rId3"/>
-    <p:sldLayoutId id="2147483652" r:id="rId4"/>
-    <p:sldLayoutId id="2147483653" r:id="rId5"/>
-    <p:sldLayoutId id="2147483654" r:id="rId6"/>
-    <p:sldLayoutId id="2147483655" r:id="rId7"/>
-    <p:sldLayoutId id="2147483656" r:id="rId8"/>
-    <p:sldLayoutId id="2147483657" r:id="rId9"/>
-    <p:sldLayoutId id="2147483658" r:id="rId10"/>
-    <p:sldLayoutId id="2147483659" r:id="rId11"/>
+    <p:sldLayoutId id="2147483661" r:id="rId1"/>
+    <p:sldLayoutId id="2147483662" r:id="rId2"/>
+    <p:sldLayoutId id="2147483663" r:id="rId3"/>
+    <p:sldLayoutId id="2147483664" r:id="rId4"/>
+    <p:sldLayoutId id="2147483665" r:id="rId5"/>
+    <p:sldLayoutId id="2147483666" r:id="rId6"/>
+    <p:sldLayoutId id="2147483667" r:id="rId7"/>
+    <p:sldLayoutId id="2147483668" r:id="rId8"/>
+    <p:sldLayoutId id="2147483669" r:id="rId9"/>
+    <p:sldLayoutId id="2147483670" r:id="rId10"/>
+    <p:sldLayoutId id="2147483671" r:id="rId11"/>
   </p:sldLayoutIdLst>
   <p:txStyles>
     <p:titleStyle>
@@ -6561,7 +6211,7 @@
         </p:nvSpPr>
         <p:spPr>
           <a:xfrm>
-            <a:off x="2683510" y="959802"/>
+            <a:off x="1159511" y="959803"/>
             <a:ext cx="3272155" cy="3287395"/>
           </a:xfrm>
           <a:prstGeom prst="ellipse">
@@ -6620,7 +6270,7 @@
         </p:nvGrpSpPr>
         <p:grpSpPr bwMode="auto">
           <a:xfrm>
-            <a:off x="2527300" y="817562"/>
+            <a:off x="1003301" y="817562"/>
             <a:ext cx="3564255" cy="3614420"/>
             <a:chOff x="80" y="0"/>
             <a:chExt cx="52401" cy="51705"/>
@@ -6777,23 +6427,19 @@
             </a:bodyPr>
             <a:lstStyle/>
             <a:p>
-              <a:pPr marL="0" marR="0" algn="ctr">
+              <a:pPr algn="ctr">
                 <a:lnSpc>
                   <a:spcPct val="90000"/>
                 </a:lnSpc>
-                <a:spcBef>
-                  <a:spcPts val="0"/>
-                </a:spcBef>
                 <a:spcAft>
                   <a:spcPts val="380"/>
                 </a:spcAft>
               </a:pPr>
               <a:r>
-                <a:rPr lang="en-US" sz="900" b="1" kern="1200">
+                <a:rPr lang="en-US" sz="900" b="1">
                   <a:solidFill>
                     <a:srgbClr val="2F5597"/>
                   </a:solidFill>
-                  <a:effectLst/>
                   <a:latin typeface="Calibri" panose="020F0502020204030204" pitchFamily="34" charset="0"/>
                   <a:ea typeface="Times New Roman" panose="02020603050405020304" pitchFamily="18" charset="0"/>
                   <a:cs typeface="Times New Roman" panose="02020603050405020304" pitchFamily="18" charset="0"/>
@@ -6801,7 +6447,6 @@
                 <a:t>Hospital</a:t>
               </a:r>
               <a:endParaRPr lang="en-US" sz="1200">
-                <a:effectLst/>
                 <a:latin typeface="Times New Roman" panose="02020603050405020304" pitchFamily="18" charset="0"/>
                 <a:ea typeface="Times New Roman" panose="02020603050405020304" pitchFamily="18" charset="0"/>
               </a:endParaRPr>
@@ -6959,23 +6604,19 @@
             </a:bodyPr>
             <a:lstStyle/>
             <a:p>
-              <a:pPr marL="0" marR="0" algn="ctr">
+              <a:pPr algn="ctr">
                 <a:lnSpc>
                   <a:spcPct val="90000"/>
                 </a:lnSpc>
-                <a:spcBef>
-                  <a:spcPts val="0"/>
-                </a:spcBef>
                 <a:spcAft>
                   <a:spcPts val="380"/>
                 </a:spcAft>
               </a:pPr>
               <a:r>
-                <a:rPr lang="en-US" sz="900" b="1" kern="1200" dirty="0">
+                <a:rPr lang="en-US" sz="900" b="1" dirty="0">
                   <a:solidFill>
                     <a:srgbClr val="2F5597"/>
                   </a:solidFill>
-                  <a:effectLst/>
                   <a:latin typeface="Calibri" panose="020F0502020204030204" pitchFamily="34" charset="0"/>
                   <a:ea typeface="Times New Roman" panose="02020603050405020304" pitchFamily="18" charset="0"/>
                   <a:cs typeface="Times New Roman" panose="02020603050405020304" pitchFamily="18" charset="0"/>
@@ -6983,7 +6624,6 @@
                 <a:t>Specialist</a:t>
               </a:r>
               <a:endParaRPr lang="en-US" sz="1200" dirty="0">
-                <a:effectLst/>
                 <a:latin typeface="Times New Roman" panose="02020603050405020304" pitchFamily="18" charset="0"/>
                 <a:ea typeface="Times New Roman" panose="02020603050405020304" pitchFamily="18" charset="0"/>
               </a:endParaRPr>
@@ -7141,23 +6781,19 @@
             </a:bodyPr>
             <a:lstStyle/>
             <a:p>
-              <a:pPr marL="0" marR="0" algn="ctr">
+              <a:pPr algn="ctr">
                 <a:lnSpc>
                   <a:spcPts val="800"/>
                 </a:lnSpc>
-                <a:spcBef>
-                  <a:spcPts val="0"/>
-                </a:spcBef>
                 <a:spcAft>
                   <a:spcPts val="300"/>
                 </a:spcAft>
               </a:pPr>
               <a:r>
-                <a:rPr lang="en-US" sz="900" b="1" kern="1200">
+                <a:rPr lang="en-US" sz="900" b="1">
                   <a:solidFill>
                     <a:srgbClr val="2F5597"/>
                   </a:solidFill>
-                  <a:effectLst/>
                   <a:latin typeface="Calibri" panose="020F0502020204030204" pitchFamily="34" charset="0"/>
                   <a:ea typeface="Times New Roman" panose="02020603050405020304" pitchFamily="18" charset="0"/>
                   <a:cs typeface="Times New Roman" panose="02020603050405020304" pitchFamily="18" charset="0"/>
@@ -7165,7 +6801,6 @@
                 <a:t>Imaging Center</a:t>
               </a:r>
               <a:endParaRPr lang="en-US" sz="1200">
-                <a:effectLst/>
                 <a:latin typeface="Times New Roman" panose="02020603050405020304" pitchFamily="18" charset="0"/>
                 <a:ea typeface="Times New Roman" panose="02020603050405020304" pitchFamily="18" charset="0"/>
               </a:endParaRPr>
@@ -7323,23 +6958,19 @@
             </a:bodyPr>
             <a:lstStyle/>
             <a:p>
-              <a:pPr marL="0" marR="0" algn="ctr">
+              <a:pPr algn="ctr">
                 <a:lnSpc>
                   <a:spcPts val="800"/>
                 </a:lnSpc>
-                <a:spcBef>
-                  <a:spcPts val="0"/>
-                </a:spcBef>
                 <a:spcAft>
                   <a:spcPts val="300"/>
                 </a:spcAft>
               </a:pPr>
               <a:r>
-                <a:rPr lang="en-US" sz="900" b="1" kern="1200">
+                <a:rPr lang="en-US" sz="900" b="1">
                   <a:solidFill>
                     <a:srgbClr val="2F5597"/>
                   </a:solidFill>
-                  <a:effectLst/>
                   <a:latin typeface="Calibri" panose="020F0502020204030204" pitchFamily="34" charset="0"/>
                   <a:ea typeface="Times New Roman" panose="02020603050405020304" pitchFamily="18" charset="0"/>
                   <a:cs typeface="Times New Roman" panose="02020603050405020304" pitchFamily="18" charset="0"/>
@@ -7347,7 +6978,6 @@
                 <a:t>Laboratory</a:t>
               </a:r>
               <a:endParaRPr lang="en-US" sz="1200">
-                <a:effectLst/>
                 <a:latin typeface="Times New Roman" panose="02020603050405020304" pitchFamily="18" charset="0"/>
                 <a:ea typeface="Times New Roman" panose="02020603050405020304" pitchFamily="18" charset="0"/>
               </a:endParaRPr>
@@ -7505,23 +7135,19 @@
             </a:bodyPr>
             <a:lstStyle/>
             <a:p>
-              <a:pPr marL="0" marR="0" algn="ctr">
+              <a:pPr algn="ctr">
                 <a:lnSpc>
                   <a:spcPct val="90000"/>
                 </a:lnSpc>
-                <a:spcBef>
-                  <a:spcPts val="0"/>
-                </a:spcBef>
                 <a:spcAft>
                   <a:spcPts val="380"/>
                 </a:spcAft>
               </a:pPr>
               <a:r>
-                <a:rPr lang="en-US" sz="900" b="1" kern="1200">
+                <a:rPr lang="en-US" sz="900" b="1">
                   <a:solidFill>
                     <a:srgbClr val="2F5597"/>
                   </a:solidFill>
-                  <a:effectLst/>
                   <a:latin typeface="Calibri" panose="020F0502020204030204" pitchFamily="34" charset="0"/>
                   <a:ea typeface="Times New Roman" panose="02020603050405020304" pitchFamily="18" charset="0"/>
                   <a:cs typeface="Times New Roman" panose="02020603050405020304" pitchFamily="18" charset="0"/>
@@ -7529,7 +7155,6 @@
                 <a:t>GP</a:t>
               </a:r>
               <a:endParaRPr lang="en-US" sz="1200">
-                <a:effectLst/>
                 <a:latin typeface="Times New Roman" panose="02020603050405020304" pitchFamily="18" charset="0"/>
                 <a:ea typeface="Times New Roman" panose="02020603050405020304" pitchFamily="18" charset="0"/>
               </a:endParaRPr>
@@ -7553,7 +7178,7 @@
         </p:nvSpPr>
         <p:spPr bwMode="auto">
           <a:xfrm>
-            <a:off x="6493474" y="1452493"/>
+            <a:off x="4969474" y="1452493"/>
             <a:ext cx="995362" cy="1296988"/>
           </a:xfrm>
           <a:custGeom>
@@ -7655,212 +7280,117 @@
           </a:bodyPr>
           <a:lstStyle/>
           <a:p>
-            <a:pPr marL="0" marR="0" lvl="0" indent="0" algn="l" defTabSz="914400" rtl="0" eaLnBrk="0" fontAlgn="base" latinLnBrk="0" hangingPunct="0">
-              <a:lnSpc>
-                <a:spcPct val="100000"/>
-              </a:lnSpc>
+            <a:pPr eaLnBrk="0" fontAlgn="base" hangingPunct="0">
               <a:spcBef>
                 <a:spcPct val="0"/>
               </a:spcBef>
               <a:spcAft>
                 <a:spcPct val="0"/>
               </a:spcAft>
-              <a:buClrTx/>
-              <a:buSzTx/>
-              <a:buFontTx/>
-              <a:buNone/>
-              <a:tabLst/>
             </a:pPr>
             <a:r>
-              <a:rPr kumimoji="0" lang="en-US" altLang="en-US" sz="700" b="1" i="0" u="none" strike="noStrike" cap="none" normalizeH="0" baseline="0" dirty="0">
-                <a:ln>
-                  <a:noFill/>
-                </a:ln>
+              <a:rPr lang="en-US" altLang="en-US" sz="700" b="1" dirty="0">
                 <a:solidFill>
                   <a:srgbClr val="385723"/>
                 </a:solidFill>
-                <a:effectLst/>
                 <a:latin typeface="Arial Narrow" panose="020B0606020202030204" pitchFamily="34" charset="0"/>
                 <a:ea typeface="Times New Roman" panose="02020603050405020304" pitchFamily="18" charset="0"/>
               </a:rPr>
               <a:t>CDA DOCUMENTS</a:t>
             </a:r>
-            <a:endParaRPr kumimoji="0" lang="en-US" altLang="en-US" sz="1200" b="0" i="0" u="none" strike="noStrike" cap="none" normalizeH="0" baseline="0" dirty="0">
-              <a:ln>
-                <a:noFill/>
-              </a:ln>
-              <a:solidFill>
-                <a:schemeClr val="tx1"/>
-              </a:solidFill>
-              <a:effectLst/>
+            <a:endParaRPr lang="en-US" altLang="en-US" sz="1200" dirty="0">
               <a:ea typeface="Times New Roman" panose="02020603050405020304" pitchFamily="18" charset="0"/>
             </a:endParaRPr>
           </a:p>
           <a:p>
-            <a:pPr marL="0" marR="0" lvl="0" indent="0" algn="l" defTabSz="914400" rtl="0" eaLnBrk="0" fontAlgn="base" latinLnBrk="0" hangingPunct="0">
-              <a:lnSpc>
-                <a:spcPct val="100000"/>
-              </a:lnSpc>
+            <a:pPr eaLnBrk="0" fontAlgn="base" hangingPunct="0">
               <a:spcBef>
                 <a:spcPct val="0"/>
               </a:spcBef>
               <a:spcAft>
                 <a:spcPct val="0"/>
               </a:spcAft>
-              <a:buClrTx/>
-              <a:buSzTx/>
-              <a:buFontTx/>
-              <a:buNone/>
-              <a:tabLst/>
             </a:pPr>
             <a:r>
-              <a:rPr kumimoji="0" lang="en-US" altLang="en-US" sz="700" b="1" i="0" u="none" strike="noStrike" cap="none" normalizeH="0" baseline="0" dirty="0">
-                <a:ln>
-                  <a:noFill/>
-                </a:ln>
+              <a:rPr lang="en-US" altLang="en-US" sz="700" b="1" dirty="0">
                 <a:solidFill>
                   <a:srgbClr val="385723"/>
                 </a:solidFill>
-                <a:effectLst/>
                 <a:latin typeface="Arial Narrow" panose="020B0606020202030204" pitchFamily="34" charset="0"/>
                 <a:ea typeface="Times New Roman" panose="02020603050405020304" pitchFamily="18" charset="0"/>
               </a:rPr>
               <a:t> Consultation Note</a:t>
             </a:r>
-            <a:endParaRPr kumimoji="0" lang="en-US" altLang="en-US" sz="1200" b="0" i="0" u="none" strike="noStrike" cap="none" normalizeH="0" baseline="0" dirty="0">
-              <a:ln>
-                <a:noFill/>
-              </a:ln>
-              <a:solidFill>
-                <a:schemeClr val="tx1"/>
-              </a:solidFill>
-              <a:effectLst/>
+            <a:endParaRPr lang="en-US" altLang="en-US" sz="1200" dirty="0">
               <a:ea typeface="Times New Roman" panose="02020603050405020304" pitchFamily="18" charset="0"/>
             </a:endParaRPr>
           </a:p>
           <a:p>
-            <a:pPr marL="0" marR="0" lvl="0" indent="0" algn="l" defTabSz="914400" rtl="0" eaLnBrk="0" fontAlgn="base" latinLnBrk="0" hangingPunct="0">
-              <a:lnSpc>
-                <a:spcPct val="100000"/>
-              </a:lnSpc>
+            <a:pPr eaLnBrk="0" fontAlgn="base" hangingPunct="0">
               <a:spcBef>
                 <a:spcPct val="0"/>
               </a:spcBef>
               <a:spcAft>
                 <a:spcPct val="0"/>
               </a:spcAft>
-              <a:buClrTx/>
-              <a:buSzTx/>
-              <a:buFontTx/>
-              <a:buNone/>
-              <a:tabLst/>
             </a:pPr>
             <a:r>
-              <a:rPr kumimoji="0" lang="en-US" altLang="en-US" sz="700" b="1" i="0" u="none" strike="noStrike" cap="none" normalizeH="0" baseline="0" dirty="0">
-                <a:ln>
-                  <a:noFill/>
-                </a:ln>
+              <a:rPr lang="en-US" altLang="en-US" sz="700" b="1" dirty="0">
                 <a:solidFill>
                   <a:srgbClr val="385723"/>
                 </a:solidFill>
-                <a:effectLst/>
                 <a:latin typeface="Arial Narrow" panose="020B0606020202030204" pitchFamily="34" charset="0"/>
                 <a:ea typeface="Times New Roman" panose="02020603050405020304" pitchFamily="18" charset="0"/>
               </a:rPr>
               <a:t>  Laboratory Report</a:t>
             </a:r>
-            <a:endParaRPr kumimoji="0" lang="en-US" altLang="en-US" sz="1200" b="0" i="0" u="none" strike="noStrike" cap="none" normalizeH="0" baseline="0" dirty="0">
-              <a:ln>
-                <a:noFill/>
-              </a:ln>
-              <a:solidFill>
-                <a:schemeClr val="tx1"/>
-              </a:solidFill>
-              <a:effectLst/>
+            <a:endParaRPr lang="en-US" altLang="en-US" sz="1200" dirty="0">
               <a:ea typeface="Times New Roman" panose="02020603050405020304" pitchFamily="18" charset="0"/>
             </a:endParaRPr>
           </a:p>
           <a:p>
-            <a:pPr marL="0" marR="0" lvl="0" indent="0" algn="l" defTabSz="914400" rtl="0" eaLnBrk="0" fontAlgn="base" latinLnBrk="0" hangingPunct="0">
-              <a:lnSpc>
-                <a:spcPct val="100000"/>
-              </a:lnSpc>
+            <a:pPr eaLnBrk="0" fontAlgn="base" hangingPunct="0">
               <a:spcBef>
                 <a:spcPct val="0"/>
               </a:spcBef>
               <a:spcAft>
                 <a:spcPct val="0"/>
               </a:spcAft>
-              <a:buClrTx/>
-              <a:buSzTx/>
-              <a:buFontTx/>
-              <a:buNone/>
-              <a:tabLst/>
             </a:pPr>
             <a:r>
-              <a:rPr kumimoji="0" lang="en-US" altLang="en-US" sz="700" b="1" i="0" u="none" strike="noStrike" cap="none" normalizeH="0" baseline="0" dirty="0">
-                <a:ln>
-                  <a:noFill/>
-                </a:ln>
+              <a:rPr lang="en-US" altLang="en-US" sz="700" b="1" dirty="0">
                 <a:solidFill>
                   <a:srgbClr val="385723"/>
                 </a:solidFill>
-                <a:effectLst/>
                 <a:latin typeface="Arial Narrow" panose="020B0606020202030204" pitchFamily="34" charset="0"/>
                 <a:ea typeface="Times New Roman" panose="02020603050405020304" pitchFamily="18" charset="0"/>
               </a:rPr>
               <a:t>  Discharge Summary</a:t>
             </a:r>
-            <a:endParaRPr kumimoji="0" lang="en-US" altLang="en-US" sz="1200" b="0" i="0" u="none" strike="noStrike" cap="none" normalizeH="0" baseline="0" dirty="0">
-              <a:ln>
-                <a:noFill/>
-              </a:ln>
-              <a:solidFill>
-                <a:schemeClr val="tx1"/>
-              </a:solidFill>
-              <a:effectLst/>
+            <a:endParaRPr lang="en-US" altLang="en-US" sz="1200" dirty="0">
               <a:ea typeface="Times New Roman" panose="02020603050405020304" pitchFamily="18" charset="0"/>
             </a:endParaRPr>
           </a:p>
           <a:p>
-            <a:pPr marL="0" marR="0" lvl="0" indent="0" algn="l" defTabSz="914400" rtl="0" eaLnBrk="0" fontAlgn="base" latinLnBrk="0" hangingPunct="0">
-              <a:lnSpc>
-                <a:spcPct val="100000"/>
-              </a:lnSpc>
+            <a:pPr eaLnBrk="0" fontAlgn="base" hangingPunct="0">
               <a:spcBef>
                 <a:spcPct val="0"/>
               </a:spcBef>
               <a:spcAft>
                 <a:spcPct val="0"/>
               </a:spcAft>
-              <a:buClrTx/>
-              <a:buSzTx/>
-              <a:buFontTx/>
-              <a:buNone/>
-              <a:tabLst/>
             </a:pPr>
             <a:r>
-              <a:rPr kumimoji="0" lang="en-US" altLang="en-US" sz="700" b="1" i="0" u="none" strike="noStrike" cap="none" normalizeH="0" baseline="0" dirty="0">
-                <a:ln>
-                  <a:noFill/>
-                </a:ln>
+              <a:rPr lang="en-US" altLang="en-US" sz="700" b="1" dirty="0">
                 <a:solidFill>
                   <a:srgbClr val="385723"/>
                 </a:solidFill>
-                <a:effectLst/>
                 <a:latin typeface="Arial Narrow" panose="020B0606020202030204" pitchFamily="34" charset="0"/>
                 <a:ea typeface="Times New Roman" panose="02020603050405020304" pitchFamily="18" charset="0"/>
               </a:rPr>
               <a:t> …</a:t>
             </a:r>
-            <a:endParaRPr kumimoji="0" lang="en-US" altLang="en-US" sz="1800" b="0" i="0" u="none" strike="noStrike" cap="none" normalizeH="0" baseline="0" dirty="0">
-              <a:ln>
-                <a:noFill/>
-              </a:ln>
-              <a:solidFill>
-                <a:schemeClr val="tx1"/>
-              </a:solidFill>
-              <a:effectLst/>
+            <a:endParaRPr lang="en-US" altLang="en-US" dirty="0">
               <a:latin typeface="Arial" panose="020B0604020202020204" pitchFamily="34" charset="0"/>
             </a:endParaRPr>
           </a:p>
@@ -7882,7 +7412,7 @@
         </p:nvGrpSpPr>
         <p:grpSpPr bwMode="auto">
           <a:xfrm>
-            <a:off x="4059555" y="980122"/>
+            <a:off x="2535556" y="980123"/>
             <a:ext cx="509905" cy="542925"/>
             <a:chOff x="15295" y="2297"/>
             <a:chExt cx="5009" cy="4948"/>
@@ -8026,7 +7556,7 @@
               </a:bodyPr>
               <a:lstStyle/>
               <a:p>
-                <a:pPr marL="0" marR="0" algn="ctr">
+                <a:pPr algn="ctr">
                   <a:spcBef>
                     <a:spcPts val="600"/>
                   </a:spcBef>
@@ -8039,14 +7569,12 @@
                     <a:solidFill>
                       <a:srgbClr val="2F5597"/>
                     </a:solidFill>
-                    <a:effectLst/>
                     <a:latin typeface="Arial Narrow" panose="020B0606020202030204" pitchFamily="34" charset="0"/>
                     <a:ea typeface="Times New Roman" panose="02020603050405020304" pitchFamily="18" charset="0"/>
                   </a:rPr>
                   <a:t>Doc</a:t>
                 </a:r>
                 <a:endParaRPr lang="en-US" sz="1200">
-                  <a:effectLst/>
                   <a:latin typeface="Times New Roman" panose="02020603050405020304" pitchFamily="18" charset="0"/>
                   <a:ea typeface="Times New Roman" panose="02020603050405020304" pitchFamily="18" charset="0"/>
                 </a:endParaRPr>
@@ -8169,27 +7697,18 @@
               </a:bodyPr>
               <a:lstStyle/>
               <a:p>
-                <a:pPr marL="0" marR="0" algn="ctr">
-                  <a:spcBef>
-                    <a:spcPts val="0"/>
-                  </a:spcBef>
-                  <a:spcAft>
-                    <a:spcPts val="0"/>
-                  </a:spcAft>
-                </a:pPr>
+                <a:pPr algn="ctr"/>
                 <a:r>
                   <a:rPr lang="en-US" sz="700" b="1">
                     <a:solidFill>
                       <a:srgbClr val="385723"/>
                     </a:solidFill>
-                    <a:effectLst/>
                     <a:latin typeface="Arial Narrow" panose="020B0606020202030204" pitchFamily="34" charset="0"/>
                     <a:ea typeface="Times New Roman" panose="02020603050405020304" pitchFamily="18" charset="0"/>
                   </a:rPr>
                   <a:t>CDA</a:t>
                 </a:r>
                 <a:endParaRPr lang="en-US" sz="1200">
-                  <a:effectLst/>
                   <a:latin typeface="Times New Roman" panose="02020603050405020304" pitchFamily="18" charset="0"/>
                   <a:ea typeface="Times New Roman" panose="02020603050405020304" pitchFamily="18" charset="0"/>
                 </a:endParaRPr>
@@ -8234,7 +7753,7 @@
               <a:noFill/>
               <a:extLst>
                 <a:ext uri="{909E8E84-426E-40dd-AFC4-6F175D3DCCD1}">
-                  <a14:hiddenFill xmlns:wpc="http://schemas.microsoft.com/office/word/2010/wordprocessingCanvas" xmlns:mc="http://schemas.openxmlformats.org/markup-compatibility/2006" xmlns:m="http://schemas.openxmlformats.org/officeDocument/2006/math" xmlns:wp14="http://schemas.microsoft.com/office/word/2010/wordprocessingDrawing" xmlns:wp="http://schemas.openxmlformats.org/drawingml/2006/wordprocessingDrawing" xmlns:w14="http://schemas.microsoft.com/office/word/2010/wordml" xmlns:w15="http://schemas.microsoft.com/office/word/2012/wordml" xmlns:wpg="http://schemas.microsoft.com/office/word/2010/wordprocessingGroup" xmlns:wpi="http://schemas.microsoft.com/office/word/2010/wordprocessingInk" xmlns:wne="http://schemas.microsoft.com/office/word/2006/wordml" xmlns:wps="http://schemas.microsoft.com/office/word/2010/wordprocessingShape" xmlns:pic="http://schemas.openxmlformats.org/drawingml/2006/picture" xmlns:cx="http://schemas.microsoft.com/office/drawing/2014/chartex" xmlns:cx1="http://schemas.microsoft.com/office/drawing/2015/9/8/chartex" xmlns:cx2="http://schemas.microsoft.com/office/drawing/2015/10/21/chartex" xmlns:cx3="http://schemas.microsoft.com/office/drawing/2016/5/9/chartex" xmlns:cx4="http://schemas.microsoft.com/office/drawing/2016/5/10/chartex" xmlns:cx5="http://schemas.microsoft.com/office/drawing/2016/5/11/chartex" xmlns:cx6="http://schemas.microsoft.com/office/drawing/2016/5/12/chartex" xmlns:cx7="http://schemas.microsoft.com/office/drawing/2016/5/13/chartex" xmlns:cx8="http://schemas.microsoft.com/office/drawing/2016/5/14/chartex" xmlns:aink="http://schemas.microsoft.com/office/drawing/2016/ink" xmlns:am3d="http://schemas.microsoft.com/office/drawing/2017/model3d" xmlns:w16cid="http://schemas.microsoft.com/office/word/2016/wordml/cid" xmlns:w16se="http://schemas.microsoft.com/office/word/2015/wordml/symex" xmlns:a14="http://schemas.microsoft.com/office/drawing/2010/main" xmlns:w="http://schemas.openxmlformats.org/wordprocessingml/2006/main" xmlns:w10="urn:schemas-microsoft-com:office:word" xmlns:v="urn:schemas-microsoft-com:vml" xmlns:o="urn:schemas-microsoft-com:office:office" xmlns:mv="urn:schemas-microsoft-com:mac:vml" xmlns:mo="http://schemas.microsoft.com/office/mac/office/2008/main" xmlns="" xmlns:arto="http://schemas.microsoft.com/office/word/2006/arto" xmlns:lc="http://schemas.openxmlformats.org/drawingml/2006/lockedCanvas">
+                  <a14:hiddenFill xmlns:lc="http://schemas.openxmlformats.org/drawingml/2006/lockedCanvas" xmlns:arto="http://schemas.microsoft.com/office/word/2006/arto" xmlns="" xmlns:mo="http://schemas.microsoft.com/office/mac/office/2008/main" xmlns:mv="urn:schemas-microsoft-com:mac:vml" xmlns:o="urn:schemas-microsoft-com:office:office" xmlns:v="urn:schemas-microsoft-com:vml" xmlns:w10="urn:schemas-microsoft-com:office:word" xmlns:w="http://schemas.openxmlformats.org/wordprocessingml/2006/main" xmlns:a14="http://schemas.microsoft.com/office/drawing/2010/main" xmlns:w16se="http://schemas.microsoft.com/office/word/2015/wordml/symex" xmlns:w16cid="http://schemas.microsoft.com/office/word/2016/wordml/cid" xmlns:am3d="http://schemas.microsoft.com/office/drawing/2017/model3d" xmlns:aink="http://schemas.microsoft.com/office/drawing/2016/ink" xmlns:cx8="http://schemas.microsoft.com/office/drawing/2016/5/14/chartex" xmlns:cx7="http://schemas.microsoft.com/office/drawing/2016/5/13/chartex" xmlns:cx6="http://schemas.microsoft.com/office/drawing/2016/5/12/chartex" xmlns:cx5="http://schemas.microsoft.com/office/drawing/2016/5/11/chartex" xmlns:cx4="http://schemas.microsoft.com/office/drawing/2016/5/10/chartex" xmlns:cx3="http://schemas.microsoft.com/office/drawing/2016/5/9/chartex" xmlns:cx2="http://schemas.microsoft.com/office/drawing/2015/10/21/chartex" xmlns:cx1="http://schemas.microsoft.com/office/drawing/2015/9/8/chartex" xmlns:cx="http://schemas.microsoft.com/office/drawing/2014/chartex" xmlns:pic="http://schemas.openxmlformats.org/drawingml/2006/picture" xmlns:wps="http://schemas.microsoft.com/office/word/2010/wordprocessingShape" xmlns:wne="http://schemas.microsoft.com/office/word/2006/wordml" xmlns:wpi="http://schemas.microsoft.com/office/word/2010/wordprocessingInk" xmlns:wpg="http://schemas.microsoft.com/office/word/2010/wordprocessingGroup" xmlns:w15="http://schemas.microsoft.com/office/word/2012/wordml" xmlns:w14="http://schemas.microsoft.com/office/word/2010/wordml" xmlns:wp="http://schemas.openxmlformats.org/drawingml/2006/wordprocessingDrawing" xmlns:wp14="http://schemas.microsoft.com/office/word/2010/wordprocessingDrawing" xmlns:m="http://schemas.openxmlformats.org/officeDocument/2006/math" xmlns:mc="http://schemas.openxmlformats.org/markup-compatibility/2006" xmlns:wpc="http://schemas.microsoft.com/office/word/2010/wordprocessingCanvas">
                     <a:solidFill>
                       <a:srgbClr val="FFFFFF"/>
                     </a:solidFill>
@@ -8307,7 +7826,7 @@
         </p:nvGrpSpPr>
         <p:grpSpPr bwMode="auto">
           <a:xfrm>
-            <a:off x="2712085" y="2112962"/>
+            <a:off x="1188086" y="2112963"/>
             <a:ext cx="509905" cy="542925"/>
             <a:chOff x="1864" y="12943"/>
             <a:chExt cx="5009" cy="4948"/>
@@ -8451,7 +7970,7 @@
               </a:bodyPr>
               <a:lstStyle/>
               <a:p>
-                <a:pPr marL="0" marR="0" algn="ctr">
+                <a:pPr algn="ctr">
                   <a:spcBef>
                     <a:spcPts val="600"/>
                   </a:spcBef>
@@ -8464,14 +7983,12 @@
                     <a:solidFill>
                       <a:srgbClr val="2F5597"/>
                     </a:solidFill>
-                    <a:effectLst/>
                     <a:latin typeface="Arial Narrow" panose="020B0606020202030204" pitchFamily="34" charset="0"/>
                     <a:ea typeface="Times New Roman" panose="02020603050405020304" pitchFamily="18" charset="0"/>
                   </a:rPr>
                   <a:t>Doc</a:t>
                 </a:r>
                 <a:endParaRPr lang="en-US" sz="1200">
-                  <a:effectLst/>
                   <a:latin typeface="Times New Roman" panose="02020603050405020304" pitchFamily="18" charset="0"/>
                   <a:ea typeface="Times New Roman" panose="02020603050405020304" pitchFamily="18" charset="0"/>
                 </a:endParaRPr>
@@ -8594,27 +8111,18 @@
               </a:bodyPr>
               <a:lstStyle/>
               <a:p>
-                <a:pPr marL="0" marR="0" algn="ctr">
-                  <a:spcBef>
-                    <a:spcPts val="0"/>
-                  </a:spcBef>
-                  <a:spcAft>
-                    <a:spcPts val="0"/>
-                  </a:spcAft>
-                </a:pPr>
+                <a:pPr algn="ctr"/>
                 <a:r>
                   <a:rPr lang="en-US" sz="700" b="1">
                     <a:solidFill>
                       <a:srgbClr val="385723"/>
                     </a:solidFill>
-                    <a:effectLst/>
                     <a:latin typeface="Arial Narrow" panose="020B0606020202030204" pitchFamily="34" charset="0"/>
                     <a:ea typeface="Times New Roman" panose="02020603050405020304" pitchFamily="18" charset="0"/>
                   </a:rPr>
                   <a:t>CDA</a:t>
                 </a:r>
                 <a:endParaRPr lang="en-US" sz="1200">
-                  <a:effectLst/>
                   <a:latin typeface="Times New Roman" panose="02020603050405020304" pitchFamily="18" charset="0"/>
                   <a:ea typeface="Times New Roman" panose="02020603050405020304" pitchFamily="18" charset="0"/>
                 </a:endParaRPr>
@@ -8659,7 +8167,7 @@
               <a:noFill/>
               <a:extLst>
                 <a:ext uri="{909E8E84-426E-40dd-AFC4-6F175D3DCCD1}">
-                  <a14:hiddenFill xmlns:wpc="http://schemas.microsoft.com/office/word/2010/wordprocessingCanvas" xmlns:mc="http://schemas.openxmlformats.org/markup-compatibility/2006" xmlns:m="http://schemas.openxmlformats.org/officeDocument/2006/math" xmlns:wp14="http://schemas.microsoft.com/office/word/2010/wordprocessingDrawing" xmlns:wp="http://schemas.openxmlformats.org/drawingml/2006/wordprocessingDrawing" xmlns:w14="http://schemas.microsoft.com/office/word/2010/wordml" xmlns:w15="http://schemas.microsoft.com/office/word/2012/wordml" xmlns:wpg="http://schemas.microsoft.com/office/word/2010/wordprocessingGroup" xmlns:wpi="http://schemas.microsoft.com/office/word/2010/wordprocessingInk" xmlns:wne="http://schemas.microsoft.com/office/word/2006/wordml" xmlns:wps="http://schemas.microsoft.com/office/word/2010/wordprocessingShape" xmlns:pic="http://schemas.openxmlformats.org/drawingml/2006/picture" xmlns:cx="http://schemas.microsoft.com/office/drawing/2014/chartex" xmlns:cx1="http://schemas.microsoft.com/office/drawing/2015/9/8/chartex" xmlns:cx2="http://schemas.microsoft.com/office/drawing/2015/10/21/chartex" xmlns:cx3="http://schemas.microsoft.com/office/drawing/2016/5/9/chartex" xmlns:cx4="http://schemas.microsoft.com/office/drawing/2016/5/10/chartex" xmlns:cx5="http://schemas.microsoft.com/office/drawing/2016/5/11/chartex" xmlns:cx6="http://schemas.microsoft.com/office/drawing/2016/5/12/chartex" xmlns:cx7="http://schemas.microsoft.com/office/drawing/2016/5/13/chartex" xmlns:cx8="http://schemas.microsoft.com/office/drawing/2016/5/14/chartex" xmlns:aink="http://schemas.microsoft.com/office/drawing/2016/ink" xmlns:am3d="http://schemas.microsoft.com/office/drawing/2017/model3d" xmlns:w16cid="http://schemas.microsoft.com/office/word/2016/wordml/cid" xmlns:w16se="http://schemas.microsoft.com/office/word/2015/wordml/symex" xmlns:a14="http://schemas.microsoft.com/office/drawing/2010/main" xmlns:w="http://schemas.openxmlformats.org/wordprocessingml/2006/main" xmlns:w10="urn:schemas-microsoft-com:office:word" xmlns:v="urn:schemas-microsoft-com:vml" xmlns:o="urn:schemas-microsoft-com:office:office" xmlns:mv="urn:schemas-microsoft-com:mac:vml" xmlns:mo="http://schemas.microsoft.com/office/mac/office/2008/main" xmlns="" xmlns:arto="http://schemas.microsoft.com/office/word/2006/arto" xmlns:lc="http://schemas.openxmlformats.org/drawingml/2006/lockedCanvas">
+                  <a14:hiddenFill xmlns:lc="http://schemas.openxmlformats.org/drawingml/2006/lockedCanvas" xmlns:arto="http://schemas.microsoft.com/office/word/2006/arto" xmlns="" xmlns:mo="http://schemas.microsoft.com/office/mac/office/2008/main" xmlns:mv="urn:schemas-microsoft-com:mac:vml" xmlns:o="urn:schemas-microsoft-com:office:office" xmlns:v="urn:schemas-microsoft-com:vml" xmlns:w10="urn:schemas-microsoft-com:office:word" xmlns:w="http://schemas.openxmlformats.org/wordprocessingml/2006/main" xmlns:a14="http://schemas.microsoft.com/office/drawing/2010/main" xmlns:w16se="http://schemas.microsoft.com/office/word/2015/wordml/symex" xmlns:w16cid="http://schemas.microsoft.com/office/word/2016/wordml/cid" xmlns:am3d="http://schemas.microsoft.com/office/drawing/2017/model3d" xmlns:aink="http://schemas.microsoft.com/office/drawing/2016/ink" xmlns:cx8="http://schemas.microsoft.com/office/drawing/2016/5/14/chartex" xmlns:cx7="http://schemas.microsoft.com/office/drawing/2016/5/13/chartex" xmlns:cx6="http://schemas.microsoft.com/office/drawing/2016/5/12/chartex" xmlns:cx5="http://schemas.microsoft.com/office/drawing/2016/5/11/chartex" xmlns:cx4="http://schemas.microsoft.com/office/drawing/2016/5/10/chartex" xmlns:cx3="http://schemas.microsoft.com/office/drawing/2016/5/9/chartex" xmlns:cx2="http://schemas.microsoft.com/office/drawing/2015/10/21/chartex" xmlns:cx1="http://schemas.microsoft.com/office/drawing/2015/9/8/chartex" xmlns:cx="http://schemas.microsoft.com/office/drawing/2014/chartex" xmlns:pic="http://schemas.openxmlformats.org/drawingml/2006/picture" xmlns:wps="http://schemas.microsoft.com/office/word/2010/wordprocessingShape" xmlns:wne="http://schemas.microsoft.com/office/word/2006/wordml" xmlns:wpi="http://schemas.microsoft.com/office/word/2010/wordprocessingInk" xmlns:wpg="http://schemas.microsoft.com/office/word/2010/wordprocessingGroup" xmlns:w15="http://schemas.microsoft.com/office/word/2012/wordml" xmlns:w14="http://schemas.microsoft.com/office/word/2010/wordml" xmlns:wp="http://schemas.openxmlformats.org/drawingml/2006/wordprocessingDrawing" xmlns:wp14="http://schemas.microsoft.com/office/word/2010/wordprocessingDrawing" xmlns:m="http://schemas.openxmlformats.org/officeDocument/2006/math" xmlns:mc="http://schemas.openxmlformats.org/markup-compatibility/2006" xmlns:wpc="http://schemas.microsoft.com/office/word/2010/wordprocessingCanvas">
                     <a:solidFill>
                       <a:srgbClr val="FFFFFF"/>
                     </a:solidFill>
@@ -8732,7 +8240,7 @@
         </p:nvSpPr>
         <p:spPr bwMode="auto">
           <a:xfrm>
-            <a:off x="3353435" y="3665299"/>
+            <a:off x="1829436" y="3665299"/>
             <a:ext cx="269875" cy="400050"/>
           </a:xfrm>
           <a:custGeom>
@@ -8834,44 +8342,25 @@
           </a:bodyPr>
           <a:lstStyle/>
           <a:p>
-            <a:pPr marL="0" marR="0" lvl="0" indent="0" algn="ctr" defTabSz="914400" rtl="0" eaLnBrk="0" fontAlgn="base" latinLnBrk="0" hangingPunct="0">
-              <a:lnSpc>
-                <a:spcPct val="100000"/>
-              </a:lnSpc>
+            <a:pPr algn="ctr" eaLnBrk="0" fontAlgn="base" hangingPunct="0">
               <a:spcBef>
                 <a:spcPct val="0"/>
               </a:spcBef>
               <a:spcAft>
                 <a:spcPct val="0"/>
               </a:spcAft>
-              <a:buClrTx/>
-              <a:buSzTx/>
-              <a:buFontTx/>
-              <a:buNone/>
-              <a:tabLst/>
             </a:pPr>
             <a:r>
-              <a:rPr kumimoji="0" lang="en-US" altLang="en-US" sz="1000" b="1" i="0" u="none" strike="noStrike" cap="none" normalizeH="0" baseline="0">
-                <a:ln>
-                  <a:noFill/>
-                </a:ln>
+              <a:rPr lang="en-US" altLang="en-US" sz="1000" b="1">
                 <a:solidFill>
                   <a:srgbClr val="2F5597"/>
                 </a:solidFill>
-                <a:effectLst/>
                 <a:latin typeface="Arial Narrow" panose="020B0606020202030204" pitchFamily="34" charset="0"/>
                 <a:ea typeface="Times New Roman" panose="02020603050405020304" pitchFamily="18" charset="0"/>
               </a:rPr>
               <a:t>Doc</a:t>
             </a:r>
-            <a:endParaRPr kumimoji="0" lang="en-US" altLang="en-US" sz="1800" b="0" i="0" u="none" strike="noStrike" cap="none" normalizeH="0" baseline="0">
-              <a:ln>
-                <a:noFill/>
-              </a:ln>
-              <a:solidFill>
-                <a:schemeClr val="tx1"/>
-              </a:solidFill>
-              <a:effectLst/>
+            <a:endParaRPr lang="en-US" altLang="en-US">
               <a:latin typeface="Arial" panose="020B0604020202020204" pitchFamily="34" charset="0"/>
             </a:endParaRPr>
           </a:p>
@@ -8893,7 +8382,7 @@
         </p:nvSpPr>
         <p:spPr bwMode="auto">
           <a:xfrm>
-            <a:off x="3328593" y="3705507"/>
+            <a:off x="1804593" y="3705507"/>
             <a:ext cx="273050" cy="393700"/>
           </a:xfrm>
           <a:custGeom>
@@ -8995,44 +8484,25 @@
           </a:bodyPr>
           <a:lstStyle/>
           <a:p>
-            <a:pPr marL="0" marR="0" lvl="0" indent="0" algn="ctr" defTabSz="914400" rtl="0" eaLnBrk="0" fontAlgn="base" latinLnBrk="0" hangingPunct="0">
-              <a:lnSpc>
-                <a:spcPct val="100000"/>
-              </a:lnSpc>
+            <a:pPr algn="ctr" eaLnBrk="0" fontAlgn="base" hangingPunct="0">
               <a:spcBef>
                 <a:spcPct val="0"/>
               </a:spcBef>
               <a:spcAft>
                 <a:spcPct val="0"/>
               </a:spcAft>
-              <a:buClrTx/>
-              <a:buSzTx/>
-              <a:buFontTx/>
-              <a:buNone/>
-              <a:tabLst/>
             </a:pPr>
             <a:r>
-              <a:rPr kumimoji="0" lang="en-US" altLang="en-US" sz="700" b="1" i="0" u="none" strike="noStrike" cap="none" normalizeH="0" baseline="0">
-                <a:ln>
-                  <a:noFill/>
-                </a:ln>
+              <a:rPr lang="en-US" altLang="en-US" sz="700" b="1">
                 <a:solidFill>
                   <a:srgbClr val="385723"/>
                 </a:solidFill>
-                <a:effectLst/>
                 <a:latin typeface="Arial Narrow" panose="020B0606020202030204" pitchFamily="34" charset="0"/>
                 <a:ea typeface="Times New Roman" panose="02020603050405020304" pitchFamily="18" charset="0"/>
               </a:rPr>
               <a:t>CDA</a:t>
             </a:r>
-            <a:endParaRPr kumimoji="0" lang="en-US" altLang="en-US" sz="1800" b="0" i="0" u="none" strike="noStrike" cap="none" normalizeH="0" baseline="0">
-              <a:ln>
-                <a:noFill/>
-              </a:ln>
-              <a:solidFill>
-                <a:schemeClr val="tx1"/>
-              </a:solidFill>
-              <a:effectLst/>
+            <a:endParaRPr lang="en-US" altLang="en-US">
               <a:latin typeface="Arial" panose="020B0604020202020204" pitchFamily="34" charset="0"/>
             </a:endParaRPr>
           </a:p>
@@ -9057,7 +8527,7 @@
           </p:nvPr>
         </p:nvGraphicFramePr>
         <p:xfrm>
-          <a:off x="3340100" y="3814127"/>
+          <a:off x="1816100" y="3814127"/>
           <a:ext cx="264160" cy="289560"/>
         </p:xfrm>
         <a:graphic>
@@ -9082,7 +8552,7 @@
         </p:nvSpPr>
         <p:spPr>
           <a:xfrm>
-            <a:off x="3209925" y="3625532"/>
+            <a:off x="1685926" y="3625533"/>
             <a:ext cx="509905" cy="542925"/>
           </a:xfrm>
           <a:prstGeom prst="flowChartMagneticDisk">
@@ -9128,7 +8598,7 @@
         </p:nvGrpSpPr>
         <p:grpSpPr bwMode="auto">
           <a:xfrm>
-            <a:off x="5407660" y="2112962"/>
+            <a:off x="3883661" y="2112963"/>
             <a:ext cx="509905" cy="542925"/>
             <a:chOff x="28850" y="12943"/>
             <a:chExt cx="5009" cy="4948"/>
@@ -9272,7 +8742,7 @@
               </a:bodyPr>
               <a:lstStyle/>
               <a:p>
-                <a:pPr marL="0" marR="0" algn="ctr">
+                <a:pPr algn="ctr">
                   <a:spcBef>
                     <a:spcPts val="600"/>
                   </a:spcBef>
@@ -9285,14 +8755,12 @@
                     <a:solidFill>
                       <a:srgbClr val="2F5597"/>
                     </a:solidFill>
-                    <a:effectLst/>
                     <a:latin typeface="Arial Narrow" panose="020B0606020202030204" pitchFamily="34" charset="0"/>
                     <a:ea typeface="Times New Roman" panose="02020603050405020304" pitchFamily="18" charset="0"/>
                   </a:rPr>
                   <a:t>Doc</a:t>
                 </a:r>
                 <a:endParaRPr lang="en-US" sz="1200">
-                  <a:effectLst/>
                   <a:latin typeface="Times New Roman" panose="02020603050405020304" pitchFamily="18" charset="0"/>
                   <a:ea typeface="Times New Roman" panose="02020603050405020304" pitchFamily="18" charset="0"/>
                 </a:endParaRPr>
@@ -9415,27 +8883,18 @@
               </a:bodyPr>
               <a:lstStyle/>
               <a:p>
-                <a:pPr marL="0" marR="0" algn="ctr">
-                  <a:spcBef>
-                    <a:spcPts val="0"/>
-                  </a:spcBef>
-                  <a:spcAft>
-                    <a:spcPts val="0"/>
-                  </a:spcAft>
-                </a:pPr>
+                <a:pPr algn="ctr"/>
                 <a:r>
                   <a:rPr lang="en-US" sz="700" b="1">
                     <a:solidFill>
                       <a:srgbClr val="385723"/>
                     </a:solidFill>
-                    <a:effectLst/>
                     <a:latin typeface="Arial Narrow" panose="020B0606020202030204" pitchFamily="34" charset="0"/>
                     <a:ea typeface="Times New Roman" panose="02020603050405020304" pitchFamily="18" charset="0"/>
                   </a:rPr>
                   <a:t>CDA</a:t>
                 </a:r>
                 <a:endParaRPr lang="en-US" sz="1200">
-                  <a:effectLst/>
                   <a:latin typeface="Times New Roman" panose="02020603050405020304" pitchFamily="18" charset="0"/>
                   <a:ea typeface="Times New Roman" panose="02020603050405020304" pitchFamily="18" charset="0"/>
                 </a:endParaRPr>
@@ -9480,7 +8939,7 @@
               <a:noFill/>
               <a:extLst>
                 <a:ext uri="{909E8E84-426E-40dd-AFC4-6F175D3DCCD1}">
-                  <a14:hiddenFill xmlns:wpc="http://schemas.microsoft.com/office/word/2010/wordprocessingCanvas" xmlns:mc="http://schemas.openxmlformats.org/markup-compatibility/2006" xmlns:m="http://schemas.openxmlformats.org/officeDocument/2006/math" xmlns:wp14="http://schemas.microsoft.com/office/word/2010/wordprocessingDrawing" xmlns:wp="http://schemas.openxmlformats.org/drawingml/2006/wordprocessingDrawing" xmlns:w14="http://schemas.microsoft.com/office/word/2010/wordml" xmlns:w15="http://schemas.microsoft.com/office/word/2012/wordml" xmlns:wpg="http://schemas.microsoft.com/office/word/2010/wordprocessingGroup" xmlns:wpi="http://schemas.microsoft.com/office/word/2010/wordprocessingInk" xmlns:wne="http://schemas.microsoft.com/office/word/2006/wordml" xmlns:wps="http://schemas.microsoft.com/office/word/2010/wordprocessingShape" xmlns:pic="http://schemas.openxmlformats.org/drawingml/2006/picture" xmlns:cx="http://schemas.microsoft.com/office/drawing/2014/chartex" xmlns:cx1="http://schemas.microsoft.com/office/drawing/2015/9/8/chartex" xmlns:cx2="http://schemas.microsoft.com/office/drawing/2015/10/21/chartex" xmlns:cx3="http://schemas.microsoft.com/office/drawing/2016/5/9/chartex" xmlns:cx4="http://schemas.microsoft.com/office/drawing/2016/5/10/chartex" xmlns:cx5="http://schemas.microsoft.com/office/drawing/2016/5/11/chartex" xmlns:cx6="http://schemas.microsoft.com/office/drawing/2016/5/12/chartex" xmlns:cx7="http://schemas.microsoft.com/office/drawing/2016/5/13/chartex" xmlns:cx8="http://schemas.microsoft.com/office/drawing/2016/5/14/chartex" xmlns:aink="http://schemas.microsoft.com/office/drawing/2016/ink" xmlns:am3d="http://schemas.microsoft.com/office/drawing/2017/model3d" xmlns:w16cid="http://schemas.microsoft.com/office/word/2016/wordml/cid" xmlns:w16se="http://schemas.microsoft.com/office/word/2015/wordml/symex" xmlns:a14="http://schemas.microsoft.com/office/drawing/2010/main" xmlns:w="http://schemas.openxmlformats.org/wordprocessingml/2006/main" xmlns:w10="urn:schemas-microsoft-com:office:word" xmlns:v="urn:schemas-microsoft-com:vml" xmlns:o="urn:schemas-microsoft-com:office:office" xmlns:mv="urn:schemas-microsoft-com:mac:vml" xmlns:mo="http://schemas.microsoft.com/office/mac/office/2008/main" xmlns="" xmlns:arto="http://schemas.microsoft.com/office/word/2006/arto" xmlns:lc="http://schemas.openxmlformats.org/drawingml/2006/lockedCanvas">
+                  <a14:hiddenFill xmlns:lc="http://schemas.openxmlformats.org/drawingml/2006/lockedCanvas" xmlns:arto="http://schemas.microsoft.com/office/word/2006/arto" xmlns="" xmlns:mo="http://schemas.microsoft.com/office/mac/office/2008/main" xmlns:mv="urn:schemas-microsoft-com:mac:vml" xmlns:o="urn:schemas-microsoft-com:office:office" xmlns:v="urn:schemas-microsoft-com:vml" xmlns:w10="urn:schemas-microsoft-com:office:word" xmlns:w="http://schemas.openxmlformats.org/wordprocessingml/2006/main" xmlns:a14="http://schemas.microsoft.com/office/drawing/2010/main" xmlns:w16se="http://schemas.microsoft.com/office/word/2015/wordml/symex" xmlns:w16cid="http://schemas.microsoft.com/office/word/2016/wordml/cid" xmlns:am3d="http://schemas.microsoft.com/office/drawing/2017/model3d" xmlns:aink="http://schemas.microsoft.com/office/drawing/2016/ink" xmlns:cx8="http://schemas.microsoft.com/office/drawing/2016/5/14/chartex" xmlns:cx7="http://schemas.microsoft.com/office/drawing/2016/5/13/chartex" xmlns:cx6="http://schemas.microsoft.com/office/drawing/2016/5/12/chartex" xmlns:cx5="http://schemas.microsoft.com/office/drawing/2016/5/11/chartex" xmlns:cx4="http://schemas.microsoft.com/office/drawing/2016/5/10/chartex" xmlns:cx3="http://schemas.microsoft.com/office/drawing/2016/5/9/chartex" xmlns:cx2="http://schemas.microsoft.com/office/drawing/2015/10/21/chartex" xmlns:cx1="http://schemas.microsoft.com/office/drawing/2015/9/8/chartex" xmlns:cx="http://schemas.microsoft.com/office/drawing/2014/chartex" xmlns:pic="http://schemas.openxmlformats.org/drawingml/2006/picture" xmlns:wps="http://schemas.microsoft.com/office/word/2010/wordprocessingShape" xmlns:wne="http://schemas.microsoft.com/office/word/2006/wordml" xmlns:wpi="http://schemas.microsoft.com/office/word/2010/wordprocessingInk" xmlns:wpg="http://schemas.microsoft.com/office/word/2010/wordprocessingGroup" xmlns:w15="http://schemas.microsoft.com/office/word/2012/wordml" xmlns:w14="http://schemas.microsoft.com/office/word/2010/wordml" xmlns:wp="http://schemas.openxmlformats.org/drawingml/2006/wordprocessingDrawing" xmlns:wp14="http://schemas.microsoft.com/office/word/2010/wordprocessingDrawing" xmlns:m="http://schemas.openxmlformats.org/officeDocument/2006/math" xmlns:mc="http://schemas.openxmlformats.org/markup-compatibility/2006" xmlns:wpc="http://schemas.microsoft.com/office/word/2010/wordprocessingCanvas">
                     <a:solidFill>
                       <a:srgbClr val="FFFFFF"/>
                     </a:solidFill>
@@ -9553,7 +9012,7 @@
         </p:nvGrpSpPr>
         <p:grpSpPr bwMode="auto">
           <a:xfrm>
-            <a:off x="4883785" y="3627437"/>
+            <a:off x="3359786" y="3627438"/>
             <a:ext cx="509905" cy="542925"/>
             <a:chOff x="23657" y="28139"/>
             <a:chExt cx="5009" cy="4948"/>
@@ -9697,7 +9156,7 @@
               </a:bodyPr>
               <a:lstStyle/>
               <a:p>
-                <a:pPr marL="0" marR="0" algn="ctr">
+                <a:pPr algn="ctr">
                   <a:spcBef>
                     <a:spcPts val="600"/>
                   </a:spcBef>
@@ -9710,14 +9169,12 @@
                     <a:solidFill>
                       <a:srgbClr val="2F5597"/>
                     </a:solidFill>
-                    <a:effectLst/>
                     <a:latin typeface="Arial Narrow" panose="020B0606020202030204" pitchFamily="34" charset="0"/>
                     <a:ea typeface="Times New Roman" panose="02020603050405020304" pitchFamily="18" charset="0"/>
                   </a:rPr>
                   <a:t>Doc</a:t>
                 </a:r>
                 <a:endParaRPr lang="en-US" sz="1200">
-                  <a:effectLst/>
                   <a:latin typeface="Times New Roman" panose="02020603050405020304" pitchFamily="18" charset="0"/>
                   <a:ea typeface="Times New Roman" panose="02020603050405020304" pitchFamily="18" charset="0"/>
                 </a:endParaRPr>
@@ -9840,27 +9297,18 @@
               </a:bodyPr>
               <a:lstStyle/>
               <a:p>
-                <a:pPr marL="0" marR="0" algn="ctr">
-                  <a:spcBef>
-                    <a:spcPts val="0"/>
-                  </a:spcBef>
-                  <a:spcAft>
-                    <a:spcPts val="0"/>
-                  </a:spcAft>
-                </a:pPr>
+                <a:pPr algn="ctr"/>
                 <a:r>
                   <a:rPr lang="en-US" sz="700" b="1">
                     <a:solidFill>
                       <a:srgbClr val="385723"/>
                     </a:solidFill>
-                    <a:effectLst/>
                     <a:latin typeface="Arial Narrow" panose="020B0606020202030204" pitchFamily="34" charset="0"/>
                     <a:ea typeface="Times New Roman" panose="02020603050405020304" pitchFamily="18" charset="0"/>
                   </a:rPr>
                   <a:t>CDA</a:t>
                 </a:r>
                 <a:endParaRPr lang="en-US" sz="1200">
-                  <a:effectLst/>
                   <a:latin typeface="Times New Roman" panose="02020603050405020304" pitchFamily="18" charset="0"/>
                   <a:ea typeface="Times New Roman" panose="02020603050405020304" pitchFamily="18" charset="0"/>
                 </a:endParaRPr>
@@ -9905,7 +9353,7 @@
               <a:noFill/>
               <a:extLst>
                 <a:ext uri="{909E8E84-426E-40dd-AFC4-6F175D3DCCD1}">
-                  <a14:hiddenFill xmlns:wpc="http://schemas.microsoft.com/office/word/2010/wordprocessingCanvas" xmlns:mc="http://schemas.openxmlformats.org/markup-compatibility/2006" xmlns:m="http://schemas.openxmlformats.org/officeDocument/2006/math" xmlns:wp14="http://schemas.microsoft.com/office/word/2010/wordprocessingDrawing" xmlns:wp="http://schemas.openxmlformats.org/drawingml/2006/wordprocessingDrawing" xmlns:w14="http://schemas.microsoft.com/office/word/2010/wordml" xmlns:w15="http://schemas.microsoft.com/office/word/2012/wordml" xmlns:wpg="http://schemas.microsoft.com/office/word/2010/wordprocessingGroup" xmlns:wpi="http://schemas.microsoft.com/office/word/2010/wordprocessingInk" xmlns:wne="http://schemas.microsoft.com/office/word/2006/wordml" xmlns:wps="http://schemas.microsoft.com/office/word/2010/wordprocessingShape" xmlns:pic="http://schemas.openxmlformats.org/drawingml/2006/picture" xmlns:cx="http://schemas.microsoft.com/office/drawing/2014/chartex" xmlns:cx1="http://schemas.microsoft.com/office/drawing/2015/9/8/chartex" xmlns:cx2="http://schemas.microsoft.com/office/drawing/2015/10/21/chartex" xmlns:cx3="http://schemas.microsoft.com/office/drawing/2016/5/9/chartex" xmlns:cx4="http://schemas.microsoft.com/office/drawing/2016/5/10/chartex" xmlns:cx5="http://schemas.microsoft.com/office/drawing/2016/5/11/chartex" xmlns:cx6="http://schemas.microsoft.com/office/drawing/2016/5/12/chartex" xmlns:cx7="http://schemas.microsoft.com/office/drawing/2016/5/13/chartex" xmlns:cx8="http://schemas.microsoft.com/office/drawing/2016/5/14/chartex" xmlns:aink="http://schemas.microsoft.com/office/drawing/2016/ink" xmlns:am3d="http://schemas.microsoft.com/office/drawing/2017/model3d" xmlns:w16cid="http://schemas.microsoft.com/office/word/2016/wordml/cid" xmlns:w16se="http://schemas.microsoft.com/office/word/2015/wordml/symex" xmlns:a14="http://schemas.microsoft.com/office/drawing/2010/main" xmlns:w="http://schemas.openxmlformats.org/wordprocessingml/2006/main" xmlns:w10="urn:schemas-microsoft-com:office:word" xmlns:v="urn:schemas-microsoft-com:vml" xmlns:o="urn:schemas-microsoft-com:office:office" xmlns:mv="urn:schemas-microsoft-com:mac:vml" xmlns:mo="http://schemas.microsoft.com/office/mac/office/2008/main" xmlns="" xmlns:arto="http://schemas.microsoft.com/office/word/2006/arto" xmlns:lc="http://schemas.openxmlformats.org/drawingml/2006/lockedCanvas">
+                  <a14:hiddenFill xmlns:lc="http://schemas.openxmlformats.org/drawingml/2006/lockedCanvas" xmlns:arto="http://schemas.microsoft.com/office/word/2006/arto" xmlns="" xmlns:mo="http://schemas.microsoft.com/office/mac/office/2008/main" xmlns:mv="urn:schemas-microsoft-com:mac:vml" xmlns:o="urn:schemas-microsoft-com:office:office" xmlns:v="urn:schemas-microsoft-com:vml" xmlns:w10="urn:schemas-microsoft-com:office:word" xmlns:w="http://schemas.openxmlformats.org/wordprocessingml/2006/main" xmlns:a14="http://schemas.microsoft.com/office/drawing/2010/main" xmlns:w16se="http://schemas.microsoft.com/office/word/2015/wordml/symex" xmlns:w16cid="http://schemas.microsoft.com/office/word/2016/wordml/cid" xmlns:am3d="http://schemas.microsoft.com/office/drawing/2017/model3d" xmlns:aink="http://schemas.microsoft.com/office/drawing/2016/ink" xmlns:cx8="http://schemas.microsoft.com/office/drawing/2016/5/14/chartex" xmlns:cx7="http://schemas.microsoft.com/office/drawing/2016/5/13/chartex" xmlns:cx6="http://schemas.microsoft.com/office/drawing/2016/5/12/chartex" xmlns:cx5="http://schemas.microsoft.com/office/drawing/2016/5/11/chartex" xmlns:cx4="http://schemas.microsoft.com/office/drawing/2016/5/10/chartex" xmlns:cx3="http://schemas.microsoft.com/office/drawing/2016/5/9/chartex" xmlns:cx2="http://schemas.microsoft.com/office/drawing/2015/10/21/chartex" xmlns:cx1="http://schemas.microsoft.com/office/drawing/2015/9/8/chartex" xmlns:cx="http://schemas.microsoft.com/office/drawing/2014/chartex" xmlns:pic="http://schemas.openxmlformats.org/drawingml/2006/picture" xmlns:wps="http://schemas.microsoft.com/office/word/2010/wordprocessingShape" xmlns:wne="http://schemas.microsoft.com/office/word/2006/wordml" xmlns:wpi="http://schemas.microsoft.com/office/word/2010/wordprocessingInk" xmlns:wpg="http://schemas.microsoft.com/office/word/2010/wordprocessingGroup" xmlns:w15="http://schemas.microsoft.com/office/word/2012/wordml" xmlns:w14="http://schemas.microsoft.com/office/word/2010/wordml" xmlns:wp="http://schemas.openxmlformats.org/drawingml/2006/wordprocessingDrawing" xmlns:wp14="http://schemas.microsoft.com/office/word/2010/wordprocessingDrawing" xmlns:m="http://schemas.openxmlformats.org/officeDocument/2006/math" xmlns:mc="http://schemas.openxmlformats.org/markup-compatibility/2006" xmlns:wpc="http://schemas.microsoft.com/office/word/2010/wordprocessingCanvas">
                     <a:solidFill>
                       <a:srgbClr val="FFFFFF"/>
                     </a:solidFill>
@@ -9978,7 +9426,7 @@
         </p:nvCxnSpPr>
         <p:spPr>
           <a:xfrm flipV="1">
-            <a:off x="4683760" y="2351087"/>
+            <a:off x="3159761" y="2351088"/>
             <a:ext cx="843915" cy="174625"/>
           </a:xfrm>
           <a:prstGeom prst="straightConnector1">
@@ -10019,7 +9467,7 @@
         </p:nvCxnSpPr>
         <p:spPr>
           <a:xfrm flipV="1">
-            <a:off x="4683760" y="2408237"/>
+            <a:off x="3159761" y="2408238"/>
             <a:ext cx="970915" cy="203835"/>
           </a:xfrm>
           <a:prstGeom prst="straightConnector1">
@@ -10060,7 +9508,7 @@
         </p:nvCxnSpPr>
         <p:spPr>
           <a:xfrm>
-            <a:off x="4569460" y="2998787"/>
+            <a:off x="3045460" y="2998787"/>
             <a:ext cx="466090" cy="727710"/>
           </a:xfrm>
           <a:prstGeom prst="straightConnector1">
@@ -10101,7 +9549,7 @@
         </p:nvCxnSpPr>
         <p:spPr>
           <a:xfrm>
-            <a:off x="4540885" y="3103562"/>
+            <a:off x="3016886" y="3103563"/>
             <a:ext cx="532765" cy="818515"/>
           </a:xfrm>
           <a:prstGeom prst="straightConnector1">
@@ -10142,7 +9590,7 @@
         </p:nvCxnSpPr>
         <p:spPr>
           <a:xfrm flipH="1" flipV="1">
-            <a:off x="3074035" y="2312987"/>
+            <a:off x="1550036" y="2312987"/>
             <a:ext cx="934085" cy="257810"/>
           </a:xfrm>
           <a:prstGeom prst="straightConnector1">
@@ -10183,7 +9631,7 @@
         </p:nvCxnSpPr>
         <p:spPr>
           <a:xfrm flipH="1" flipV="1">
-            <a:off x="2969260" y="2370137"/>
+            <a:off x="1445261" y="2370138"/>
             <a:ext cx="964565" cy="262255"/>
           </a:xfrm>
           <a:prstGeom prst="straightConnector1">
@@ -10224,7 +9672,7 @@
         </p:nvCxnSpPr>
         <p:spPr>
           <a:xfrm flipH="1">
-            <a:off x="3531235" y="3018704"/>
+            <a:off x="2007236" y="3018705"/>
             <a:ext cx="489585" cy="681355"/>
           </a:xfrm>
           <a:prstGeom prst="straightConnector1">
@@ -10265,7 +9713,7 @@
         </p:nvCxnSpPr>
         <p:spPr>
           <a:xfrm flipH="1">
-            <a:off x="3502660" y="3065462"/>
+            <a:off x="1978661" y="3065463"/>
             <a:ext cx="593725" cy="823595"/>
           </a:xfrm>
           <a:prstGeom prst="straightConnector1">
@@ -10306,7 +9754,7 @@
         </p:nvCxnSpPr>
         <p:spPr>
           <a:xfrm flipH="1">
-            <a:off x="4502785" y="2170112"/>
+            <a:off x="2978786" y="2170112"/>
             <a:ext cx="191135" cy="227330"/>
           </a:xfrm>
           <a:prstGeom prst="straightConnector1">
@@ -10347,7 +9795,7 @@
         </p:nvCxnSpPr>
         <p:spPr>
           <a:xfrm flipH="1">
-            <a:off x="4569460" y="2246312"/>
+            <a:off x="3045460" y="2246313"/>
             <a:ext cx="177800" cy="208915"/>
           </a:xfrm>
           <a:prstGeom prst="straightConnector1">
@@ -10394,7 +9842,7 @@
         </p:blipFill>
         <p:spPr>
           <a:xfrm>
-            <a:off x="4607560" y="1921827"/>
+            <a:off x="3083561" y="1921828"/>
             <a:ext cx="390525" cy="351155"/>
           </a:xfrm>
           <a:prstGeom prst="rect">
@@ -10423,7 +9871,7 @@
         </p:nvCxnSpPr>
         <p:spPr>
           <a:xfrm flipV="1">
-            <a:off x="4340860" y="1360487"/>
+            <a:off x="2816861" y="1360487"/>
             <a:ext cx="3175" cy="910590"/>
           </a:xfrm>
           <a:prstGeom prst="straightConnector1">
@@ -10464,7 +9912,7 @@
         </p:nvCxnSpPr>
         <p:spPr>
           <a:xfrm flipH="1" flipV="1">
-            <a:off x="4264660" y="1466707"/>
+            <a:off x="2740661" y="1466707"/>
             <a:ext cx="1905" cy="791210"/>
           </a:xfrm>
           <a:prstGeom prst="straightConnector1">
@@ -10505,7 +9953,7 @@
         </p:nvSpPr>
         <p:spPr>
           <a:xfrm>
-            <a:off x="3737610" y="2157412"/>
+            <a:off x="2213611" y="2157412"/>
             <a:ext cx="1110615" cy="1029970"/>
           </a:xfrm>
           <a:prstGeom prst="star5">
@@ -10577,7 +10025,7 @@
         </p:nvSpPr>
         <p:spPr bwMode="auto">
           <a:xfrm>
-            <a:off x="3892297" y="2335058"/>
+            <a:off x="2368297" y="2335058"/>
             <a:ext cx="854830" cy="755650"/>
           </a:xfrm>
           <a:prstGeom prst="ellipse">
@@ -10616,45 +10064,25 @@
           </a:bodyPr>
           <a:lstStyle/>
           <a:p>
-            <a:pPr marL="0" marR="0" lvl="0" indent="0" algn="ctr" defTabSz="914400" rtl="0" eaLnBrk="0" fontAlgn="base" latinLnBrk="0" hangingPunct="0">
-              <a:lnSpc>
-                <a:spcPct val="100000"/>
-              </a:lnSpc>
+            <a:pPr algn="ctr" eaLnBrk="0" fontAlgn="base" hangingPunct="0">
               <a:spcBef>
                 <a:spcPct val="0"/>
               </a:spcBef>
               <a:spcAft>
                 <a:spcPct val="0"/>
               </a:spcAft>
-              <a:buClrTx/>
-              <a:buSzTx/>
-              <a:buFontTx/>
-              <a:buNone/>
-              <a:tabLst/>
             </a:pPr>
             <a:r>
-              <a:rPr kumimoji="0" lang="en-US" altLang="en-US" sz="800" b="1" i="0" u="none" strike="noStrike" cap="none" normalizeH="0" baseline="0" dirty="0">
-                <a:ln>
-                  <a:noFill/>
-                </a:ln>
+              <a:rPr lang="en-US" altLang="en-US" sz="800" b="1" dirty="0">
                 <a:solidFill>
                   <a:srgbClr val="595959"/>
                 </a:solidFill>
-                <a:effectLst/>
                 <a:ea typeface="Times New Roman" panose="02020603050405020304" pitchFamily="18" charset="0"/>
                 <a:cs typeface="Calibri" panose="020F0502020204030204" pitchFamily="34" charset="0"/>
               </a:rPr>
               <a:t>health data exchange infrastructure</a:t>
             </a:r>
-            <a:endParaRPr kumimoji="0" lang="en-US" altLang="en-US" sz="800" b="0" i="0" u="none" strike="noStrike" cap="none" normalizeH="0" baseline="0" dirty="0">
-              <a:ln>
-                <a:noFill/>
-              </a:ln>
-              <a:solidFill>
-                <a:schemeClr val="tx1"/>
-              </a:solidFill>
-              <a:effectLst/>
-            </a:endParaRPr>
+            <a:endParaRPr lang="en-US" altLang="en-US" sz="800" dirty="0"/>
           </a:p>
         </p:txBody>
       </p:sp>
@@ -10674,7 +10102,7 @@
         </p:nvGrpSpPr>
         <p:grpSpPr bwMode="auto">
           <a:xfrm>
-            <a:off x="3681730" y="1896427"/>
+            <a:off x="2157730" y="1896428"/>
             <a:ext cx="566420" cy="619125"/>
             <a:chOff x="11629" y="10616"/>
             <a:chExt cx="8668" cy="9128"/>
@@ -10725,7 +10153,7 @@
             </a:effectLst>
             <a:extLst>
               <a:ext uri="{909E8E84-426E-40dd-AFC4-6F175D3DCCD1}">
-                <a14:hiddenFill xmlns:wpc="http://schemas.microsoft.com/office/word/2010/wordprocessingCanvas" xmlns:mc="http://schemas.openxmlformats.org/markup-compatibility/2006" xmlns:m="http://schemas.openxmlformats.org/officeDocument/2006/math" xmlns:wp14="http://schemas.microsoft.com/office/word/2010/wordprocessingDrawing" xmlns:wp="http://schemas.openxmlformats.org/drawingml/2006/wordprocessingDrawing" xmlns:w14="http://schemas.microsoft.com/office/word/2010/wordml" xmlns:w15="http://schemas.microsoft.com/office/word/2012/wordml" xmlns:wpg="http://schemas.microsoft.com/office/word/2010/wordprocessingGroup" xmlns:wpi="http://schemas.microsoft.com/office/word/2010/wordprocessingInk" xmlns:wne="http://schemas.microsoft.com/office/word/2006/wordml" xmlns:wps="http://schemas.microsoft.com/office/word/2010/wordprocessingShape" xmlns:pic="http://schemas.openxmlformats.org/drawingml/2006/picture" xmlns:cx="http://schemas.microsoft.com/office/drawing/2014/chartex" xmlns:cx1="http://schemas.microsoft.com/office/drawing/2015/9/8/chartex" xmlns:cx2="http://schemas.microsoft.com/office/drawing/2015/10/21/chartex" xmlns:cx3="http://schemas.microsoft.com/office/drawing/2016/5/9/chartex" xmlns:cx4="http://schemas.microsoft.com/office/drawing/2016/5/10/chartex" xmlns:cx5="http://schemas.microsoft.com/office/drawing/2016/5/11/chartex" xmlns:cx6="http://schemas.microsoft.com/office/drawing/2016/5/12/chartex" xmlns:cx7="http://schemas.microsoft.com/office/drawing/2016/5/13/chartex" xmlns:cx8="http://schemas.microsoft.com/office/drawing/2016/5/14/chartex" xmlns:aink="http://schemas.microsoft.com/office/drawing/2016/ink" xmlns:am3d="http://schemas.microsoft.com/office/drawing/2017/model3d" xmlns:w16cid="http://schemas.microsoft.com/office/word/2016/wordml/cid" xmlns:w16se="http://schemas.microsoft.com/office/word/2015/wordml/symex" xmlns:a14="http://schemas.microsoft.com/office/drawing/2010/main" xmlns:w="http://schemas.openxmlformats.org/wordprocessingml/2006/main" xmlns:w10="urn:schemas-microsoft-com:office:word" xmlns:v="urn:schemas-microsoft-com:vml" xmlns:o="urn:schemas-microsoft-com:office:office" xmlns:mv="urn:schemas-microsoft-com:mac:vml" xmlns:mo="http://schemas.microsoft.com/office/mac/office/2008/main" xmlns="" xmlns:arto="http://schemas.microsoft.com/office/word/2006/arto" xmlns:lc="http://schemas.openxmlformats.org/drawingml/2006/lockedCanvas">
+                <a14:hiddenFill xmlns:lc="http://schemas.openxmlformats.org/drawingml/2006/lockedCanvas" xmlns:arto="http://schemas.microsoft.com/office/word/2006/arto" xmlns="" xmlns:mo="http://schemas.microsoft.com/office/mac/office/2008/main" xmlns:mv="urn:schemas-microsoft-com:mac:vml" xmlns:o="urn:schemas-microsoft-com:office:office" xmlns:v="urn:schemas-microsoft-com:vml" xmlns:w10="urn:schemas-microsoft-com:office:word" xmlns:w="http://schemas.openxmlformats.org/wordprocessingml/2006/main" xmlns:a14="http://schemas.microsoft.com/office/drawing/2010/main" xmlns:w16se="http://schemas.microsoft.com/office/word/2015/wordml/symex" xmlns:w16cid="http://schemas.microsoft.com/office/word/2016/wordml/cid" xmlns:am3d="http://schemas.microsoft.com/office/drawing/2017/model3d" xmlns:aink="http://schemas.microsoft.com/office/drawing/2016/ink" xmlns:cx8="http://schemas.microsoft.com/office/drawing/2016/5/14/chartex" xmlns:cx7="http://schemas.microsoft.com/office/drawing/2016/5/13/chartex" xmlns:cx6="http://schemas.microsoft.com/office/drawing/2016/5/12/chartex" xmlns:cx5="http://schemas.microsoft.com/office/drawing/2016/5/11/chartex" xmlns:cx4="http://schemas.microsoft.com/office/drawing/2016/5/10/chartex" xmlns:cx3="http://schemas.microsoft.com/office/drawing/2016/5/9/chartex" xmlns:cx2="http://schemas.microsoft.com/office/drawing/2015/10/21/chartex" xmlns:cx1="http://schemas.microsoft.com/office/drawing/2015/9/8/chartex" xmlns:cx="http://schemas.microsoft.com/office/drawing/2014/chartex" xmlns:pic="http://schemas.openxmlformats.org/drawingml/2006/picture" xmlns:wps="http://schemas.microsoft.com/office/word/2010/wordprocessingShape" xmlns:wne="http://schemas.microsoft.com/office/word/2006/wordml" xmlns:wpi="http://schemas.microsoft.com/office/word/2010/wordprocessingInk" xmlns:wpg="http://schemas.microsoft.com/office/word/2010/wordprocessingGroup" xmlns:w15="http://schemas.microsoft.com/office/word/2012/wordml" xmlns:w14="http://schemas.microsoft.com/office/word/2010/wordml" xmlns:wp="http://schemas.openxmlformats.org/drawingml/2006/wordprocessingDrawing" xmlns:wp14="http://schemas.microsoft.com/office/word/2010/wordprocessingDrawing" xmlns:m="http://schemas.openxmlformats.org/officeDocument/2006/math" xmlns:mc="http://schemas.openxmlformats.org/markup-compatibility/2006" xmlns:wpc="http://schemas.microsoft.com/office/word/2010/wordprocessingCanvas">
                   <a:solidFill>
                     <a:srgbClr val="FFFFFF"/>
                   </a:solidFill>
@@ -10762,14 +10190,14 @@
             </a:ln>
             <a:extLst>
               <a:ext uri="{909E8E84-426E-40dd-AFC4-6F175D3DCCD1}">
-                <a14:hiddenFill xmlns:wpc="http://schemas.microsoft.com/office/word/2010/wordprocessingCanvas" xmlns:mc="http://schemas.openxmlformats.org/markup-compatibility/2006" xmlns:m="http://schemas.openxmlformats.org/officeDocument/2006/math" xmlns:wp14="http://schemas.microsoft.com/office/word/2010/wordprocessingDrawing" xmlns:wp="http://schemas.openxmlformats.org/drawingml/2006/wordprocessingDrawing" xmlns:w14="http://schemas.microsoft.com/office/word/2010/wordml" xmlns:w15="http://schemas.microsoft.com/office/word/2012/wordml" xmlns:wpg="http://schemas.microsoft.com/office/word/2010/wordprocessingGroup" xmlns:wpi="http://schemas.microsoft.com/office/word/2010/wordprocessingInk" xmlns:wne="http://schemas.microsoft.com/office/word/2006/wordml" xmlns:wps="http://schemas.microsoft.com/office/word/2010/wordprocessingShape" xmlns:cx="http://schemas.microsoft.com/office/drawing/2014/chartex" xmlns:cx1="http://schemas.microsoft.com/office/drawing/2015/9/8/chartex" xmlns:cx2="http://schemas.microsoft.com/office/drawing/2015/10/21/chartex" xmlns:cx3="http://schemas.microsoft.com/office/drawing/2016/5/9/chartex" xmlns:cx4="http://schemas.microsoft.com/office/drawing/2016/5/10/chartex" xmlns:cx5="http://schemas.microsoft.com/office/drawing/2016/5/11/chartex" xmlns:cx6="http://schemas.microsoft.com/office/drawing/2016/5/12/chartex" xmlns:cx7="http://schemas.microsoft.com/office/drawing/2016/5/13/chartex" xmlns:cx8="http://schemas.microsoft.com/office/drawing/2016/5/14/chartex" xmlns:aink="http://schemas.microsoft.com/office/drawing/2016/ink" xmlns:am3d="http://schemas.microsoft.com/office/drawing/2017/model3d" xmlns:w16cid="http://schemas.microsoft.com/office/word/2016/wordml/cid" xmlns:w16se="http://schemas.microsoft.com/office/word/2015/wordml/symex" xmlns:a14="http://schemas.microsoft.com/office/drawing/2010/main" xmlns:w="http://schemas.openxmlformats.org/wordprocessingml/2006/main" xmlns:w10="urn:schemas-microsoft-com:office:word" xmlns:v="urn:schemas-microsoft-com:vml" xmlns:o="urn:schemas-microsoft-com:office:office" xmlns:mv="urn:schemas-microsoft-com:mac:vml" xmlns:mo="http://schemas.microsoft.com/office/mac/office/2008/main" xmlns="" xmlns:arto="http://schemas.microsoft.com/office/word/2006/arto" xmlns:lc="http://schemas.openxmlformats.org/drawingml/2006/lockedCanvas">
+                <a14:hiddenFill xmlns:lc="http://schemas.openxmlformats.org/drawingml/2006/lockedCanvas" xmlns:arto="http://schemas.microsoft.com/office/word/2006/arto" xmlns="" xmlns:mo="http://schemas.microsoft.com/office/mac/office/2008/main" xmlns:mv="urn:schemas-microsoft-com:mac:vml" xmlns:o="urn:schemas-microsoft-com:office:office" xmlns:v="urn:schemas-microsoft-com:vml" xmlns:w10="urn:schemas-microsoft-com:office:word" xmlns:w="http://schemas.openxmlformats.org/wordprocessingml/2006/main" xmlns:a14="http://schemas.microsoft.com/office/drawing/2010/main" xmlns:w16se="http://schemas.microsoft.com/office/word/2015/wordml/symex" xmlns:w16cid="http://schemas.microsoft.com/office/word/2016/wordml/cid" xmlns:am3d="http://schemas.microsoft.com/office/drawing/2017/model3d" xmlns:aink="http://schemas.microsoft.com/office/drawing/2016/ink" xmlns:cx8="http://schemas.microsoft.com/office/drawing/2016/5/14/chartex" xmlns:cx7="http://schemas.microsoft.com/office/drawing/2016/5/13/chartex" xmlns:cx6="http://schemas.microsoft.com/office/drawing/2016/5/12/chartex" xmlns:cx5="http://schemas.microsoft.com/office/drawing/2016/5/11/chartex" xmlns:cx4="http://schemas.microsoft.com/office/drawing/2016/5/10/chartex" xmlns:cx3="http://schemas.microsoft.com/office/drawing/2016/5/9/chartex" xmlns:cx2="http://schemas.microsoft.com/office/drawing/2015/10/21/chartex" xmlns:cx1="http://schemas.microsoft.com/office/drawing/2015/9/8/chartex" xmlns:cx="http://schemas.microsoft.com/office/drawing/2014/chartex" xmlns:wps="http://schemas.microsoft.com/office/word/2010/wordprocessingShape" xmlns:wne="http://schemas.microsoft.com/office/word/2006/wordml" xmlns:wpi="http://schemas.microsoft.com/office/word/2010/wordprocessingInk" xmlns:wpg="http://schemas.microsoft.com/office/word/2010/wordprocessingGroup" xmlns:w15="http://schemas.microsoft.com/office/word/2012/wordml" xmlns:w14="http://schemas.microsoft.com/office/word/2010/wordml" xmlns:wp="http://schemas.openxmlformats.org/drawingml/2006/wordprocessingDrawing" xmlns:wp14="http://schemas.microsoft.com/office/word/2010/wordprocessingDrawing" xmlns:m="http://schemas.openxmlformats.org/officeDocument/2006/math" xmlns:mc="http://schemas.openxmlformats.org/markup-compatibility/2006" xmlns:wpc="http://schemas.microsoft.com/office/word/2010/wordprocessingCanvas">
                   <a:solidFill>
                     <a:srgbClr val="FFFFFF"/>
                   </a:solidFill>
                 </a14:hiddenFill>
               </a:ext>
               <a:ext uri="{91240B29-F687-4f45-9708-019B960494DF}">
-                <a14:hiddenLine xmlns:wpc="http://schemas.microsoft.com/office/word/2010/wordprocessingCanvas" xmlns:mc="http://schemas.openxmlformats.org/markup-compatibility/2006" xmlns:m="http://schemas.openxmlformats.org/officeDocument/2006/math" xmlns:wp14="http://schemas.microsoft.com/office/word/2010/wordprocessingDrawing" xmlns:wp="http://schemas.openxmlformats.org/drawingml/2006/wordprocessingDrawing" xmlns:w14="http://schemas.microsoft.com/office/word/2010/wordml" xmlns:w15="http://schemas.microsoft.com/office/word/2012/wordml" xmlns:wpg="http://schemas.microsoft.com/office/word/2010/wordprocessingGroup" xmlns:wpi="http://schemas.microsoft.com/office/word/2010/wordprocessingInk" xmlns:wne="http://schemas.microsoft.com/office/word/2006/wordml" xmlns:wps="http://schemas.microsoft.com/office/word/2010/wordprocessingShape" xmlns:cx="http://schemas.microsoft.com/office/drawing/2014/chartex" xmlns:cx1="http://schemas.microsoft.com/office/drawing/2015/9/8/chartex" xmlns:cx2="http://schemas.microsoft.com/office/drawing/2015/10/21/chartex" xmlns:cx3="http://schemas.microsoft.com/office/drawing/2016/5/9/chartex" xmlns:cx4="http://schemas.microsoft.com/office/drawing/2016/5/10/chartex" xmlns:cx5="http://schemas.microsoft.com/office/drawing/2016/5/11/chartex" xmlns:cx6="http://schemas.microsoft.com/office/drawing/2016/5/12/chartex" xmlns:cx7="http://schemas.microsoft.com/office/drawing/2016/5/13/chartex" xmlns:cx8="http://schemas.microsoft.com/office/drawing/2016/5/14/chartex" xmlns:aink="http://schemas.microsoft.com/office/drawing/2016/ink" xmlns:am3d="http://schemas.microsoft.com/office/drawing/2017/model3d" xmlns:w16cid="http://schemas.microsoft.com/office/word/2016/wordml/cid" xmlns:w16se="http://schemas.microsoft.com/office/word/2015/wordml/symex" xmlns:a14="http://schemas.microsoft.com/office/drawing/2010/main" xmlns:w="http://schemas.openxmlformats.org/wordprocessingml/2006/main" xmlns:w10="urn:schemas-microsoft-com:office:word" xmlns:v="urn:schemas-microsoft-com:vml" xmlns:o="urn:schemas-microsoft-com:office:office" xmlns:mv="urn:schemas-microsoft-com:mac:vml" xmlns:mo="http://schemas.microsoft.com/office/mac/office/2008/main" xmlns="" xmlns:arto="http://schemas.microsoft.com/office/word/2006/arto" xmlns:lc="http://schemas.openxmlformats.org/drawingml/2006/lockedCanvas" w="9525">
+                <a14:hiddenLine xmlns:lc="http://schemas.openxmlformats.org/drawingml/2006/lockedCanvas" xmlns:arto="http://schemas.microsoft.com/office/word/2006/arto" xmlns="" xmlns:mo="http://schemas.microsoft.com/office/mac/office/2008/main" xmlns:mv="urn:schemas-microsoft-com:mac:vml" xmlns:o="urn:schemas-microsoft-com:office:office" xmlns:v="urn:schemas-microsoft-com:vml" xmlns:w10="urn:schemas-microsoft-com:office:word" xmlns:w="http://schemas.openxmlformats.org/wordprocessingml/2006/main" xmlns:a14="http://schemas.microsoft.com/office/drawing/2010/main" xmlns:w16se="http://schemas.microsoft.com/office/word/2015/wordml/symex" xmlns:w16cid="http://schemas.microsoft.com/office/word/2016/wordml/cid" xmlns:am3d="http://schemas.microsoft.com/office/drawing/2017/model3d" xmlns:aink="http://schemas.microsoft.com/office/drawing/2016/ink" xmlns:cx8="http://schemas.microsoft.com/office/drawing/2016/5/14/chartex" xmlns:cx7="http://schemas.microsoft.com/office/drawing/2016/5/13/chartex" xmlns:cx6="http://schemas.microsoft.com/office/drawing/2016/5/12/chartex" xmlns:cx5="http://schemas.microsoft.com/office/drawing/2016/5/11/chartex" xmlns:cx4="http://schemas.microsoft.com/office/drawing/2016/5/10/chartex" xmlns:cx3="http://schemas.microsoft.com/office/drawing/2016/5/9/chartex" xmlns:cx2="http://schemas.microsoft.com/office/drawing/2015/10/21/chartex" xmlns:cx1="http://schemas.microsoft.com/office/drawing/2015/9/8/chartex" xmlns:cx="http://schemas.microsoft.com/office/drawing/2014/chartex" xmlns:wps="http://schemas.microsoft.com/office/word/2010/wordprocessingShape" xmlns:wne="http://schemas.microsoft.com/office/word/2006/wordml" xmlns:wpi="http://schemas.microsoft.com/office/word/2010/wordprocessingInk" xmlns:wpg="http://schemas.microsoft.com/office/word/2010/wordprocessingGroup" xmlns:w15="http://schemas.microsoft.com/office/word/2012/wordml" xmlns:w14="http://schemas.microsoft.com/office/word/2010/wordml" xmlns:wp="http://schemas.openxmlformats.org/drawingml/2006/wordprocessingDrawing" xmlns:wp14="http://schemas.microsoft.com/office/word/2010/wordprocessingDrawing" xmlns:m="http://schemas.openxmlformats.org/officeDocument/2006/math" xmlns:mc="http://schemas.openxmlformats.org/markup-compatibility/2006" xmlns:wpc="http://schemas.microsoft.com/office/word/2010/wordprocessingCanvas" w="9525">
                   <a:solidFill>
                     <a:srgbClr val="000000"/>
                   </a:solidFill>
@@ -10786,20 +10214,12 @@
             </a:bodyPr>
             <a:lstStyle/>
             <a:p>
-              <a:pPr marL="0" marR="0" algn="ctr">
-                <a:spcBef>
-                  <a:spcPts val="0"/>
-                </a:spcBef>
-                <a:spcAft>
-                  <a:spcPts val="0"/>
-                </a:spcAft>
-              </a:pPr>
+              <a:pPr algn="ctr"/>
               <a:r>
-                <a:rPr lang="en-US" sz="750" b="1" kern="1200">
+                <a:rPr lang="en-US" sz="750" b="1">
                   <a:solidFill>
                     <a:srgbClr val="FFFFFF"/>
                   </a:solidFill>
-                  <a:effectLst/>
                   <a:latin typeface="Calibri" panose="020F0502020204030204" pitchFamily="34" charset="0"/>
                   <a:ea typeface="Times New Roman" panose="02020603050405020304" pitchFamily="18" charset="0"/>
                   <a:cs typeface="Times New Roman" panose="02020603050405020304" pitchFamily="18" charset="0"/>
@@ -10807,7 +10227,6 @@
                 <a:t>PATIENT</a:t>
               </a:r>
               <a:endParaRPr lang="en-US" sz="1200">
-                <a:effectLst/>
                 <a:latin typeface="Times New Roman" panose="02020603050405020304" pitchFamily="18" charset="0"/>
                 <a:ea typeface="Times New Roman" panose="02020603050405020304" pitchFamily="18" charset="0"/>
               </a:endParaRPr>
@@ -10831,8 +10250,8 @@
         </p:nvSpPr>
         <p:spPr bwMode="auto">
           <a:xfrm>
-            <a:off x="0" y="0"/>
-            <a:ext cx="12192000" cy="457200"/>
+            <a:off x="-1524000" y="43934"/>
+            <a:ext cx="184731" cy="369332"/>
           </a:xfrm>
           <a:prstGeom prst="rect">
             <a:avLst/>
@@ -10898,7 +10317,7 @@
         </p:nvSpPr>
         <p:spPr>
           <a:xfrm>
-            <a:off x="6236337" y="3017516"/>
+            <a:off x="4712338" y="3017517"/>
             <a:ext cx="1475105" cy="1374775"/>
           </a:xfrm>
           <a:prstGeom prst="hexagon">
@@ -10943,235 +10362,154 @@
           </a:bodyPr>
           <a:lstStyle/>
           <a:p>
-            <a:pPr marL="0" marR="0" algn="ctr">
-              <a:spcBef>
-                <a:spcPts val="0"/>
-              </a:spcBef>
-              <a:spcAft>
-                <a:spcPts val="0"/>
-              </a:spcAft>
-            </a:pPr>
+            <a:pPr algn="ctr"/>
             <a:r>
               <a:rPr lang="en-US" sz="750" b="1" dirty="0">
                 <a:solidFill>
                   <a:srgbClr val="CC6600"/>
                 </a:solidFill>
-                <a:effectLst/>
                 <a:latin typeface="Arial Narrow" panose="020B0606020202030204" pitchFamily="34" charset="0"/>
                 <a:ea typeface="Times New Roman" panose="02020603050405020304" pitchFamily="18" charset="0"/>
               </a:rPr>
               <a:t>DATA ELEMENTS</a:t>
             </a:r>
             <a:endParaRPr lang="en-US" sz="1200" dirty="0">
-              <a:effectLst/>
               <a:latin typeface="Times New Roman" panose="02020603050405020304" pitchFamily="18" charset="0"/>
               <a:ea typeface="Times New Roman" panose="02020603050405020304" pitchFamily="18" charset="0"/>
             </a:endParaRPr>
           </a:p>
           <a:p>
-            <a:pPr marL="0" marR="0" algn="ctr">
-              <a:spcBef>
-                <a:spcPts val="0"/>
-              </a:spcBef>
-              <a:spcAft>
-                <a:spcPts val="0"/>
-              </a:spcAft>
-            </a:pPr>
+            <a:pPr algn="ctr"/>
             <a:r>
               <a:rPr lang="en-US" sz="700" b="1" dirty="0">
                 <a:solidFill>
                   <a:srgbClr val="CC6600"/>
                 </a:solidFill>
-                <a:effectLst/>
                 <a:latin typeface="Arial Narrow" panose="020B0606020202030204" pitchFamily="34" charset="0"/>
                 <a:ea typeface="Times New Roman" panose="02020603050405020304" pitchFamily="18" charset="0"/>
               </a:rPr>
               <a:t>Problems</a:t>
             </a:r>
             <a:endParaRPr lang="en-US" sz="1200" dirty="0">
-              <a:effectLst/>
               <a:latin typeface="Times New Roman" panose="02020603050405020304" pitchFamily="18" charset="0"/>
               <a:ea typeface="Times New Roman" panose="02020603050405020304" pitchFamily="18" charset="0"/>
             </a:endParaRPr>
           </a:p>
           <a:p>
-            <a:pPr marL="0" marR="0" algn="ctr">
-              <a:spcBef>
-                <a:spcPts val="0"/>
-              </a:spcBef>
-              <a:spcAft>
-                <a:spcPts val="0"/>
-              </a:spcAft>
-            </a:pPr>
+            <a:pPr algn="ctr"/>
             <a:r>
               <a:rPr lang="en-US" sz="700" b="1" dirty="0">
                 <a:solidFill>
                   <a:srgbClr val="CC6600"/>
                 </a:solidFill>
-                <a:effectLst/>
                 <a:latin typeface="Arial Narrow" panose="020B0606020202030204" pitchFamily="34" charset="0"/>
                 <a:ea typeface="Times New Roman" panose="02020603050405020304" pitchFamily="18" charset="0"/>
               </a:rPr>
               <a:t>Observations</a:t>
             </a:r>
             <a:endParaRPr lang="en-US" sz="1200" dirty="0">
-              <a:effectLst/>
               <a:latin typeface="Times New Roman" panose="02020603050405020304" pitchFamily="18" charset="0"/>
               <a:ea typeface="Times New Roman" panose="02020603050405020304" pitchFamily="18" charset="0"/>
             </a:endParaRPr>
           </a:p>
           <a:p>
-            <a:pPr marL="0" marR="0" algn="ctr">
-              <a:spcBef>
-                <a:spcPts val="0"/>
-              </a:spcBef>
-              <a:spcAft>
-                <a:spcPts val="0"/>
-              </a:spcAft>
-            </a:pPr>
+            <a:pPr algn="ctr"/>
             <a:r>
               <a:rPr lang="en-US" sz="700" b="1" dirty="0">
                 <a:solidFill>
                   <a:srgbClr val="CC6600"/>
                 </a:solidFill>
-                <a:effectLst/>
                 <a:latin typeface="Arial Narrow" panose="020B0606020202030204" pitchFamily="34" charset="0"/>
                 <a:ea typeface="Times New Roman" panose="02020603050405020304" pitchFamily="18" charset="0"/>
               </a:rPr>
               <a:t>Diagnostic Results</a:t>
             </a:r>
             <a:endParaRPr lang="en-US" sz="1200" dirty="0">
-              <a:effectLst/>
               <a:latin typeface="Times New Roman" panose="02020603050405020304" pitchFamily="18" charset="0"/>
               <a:ea typeface="Times New Roman" panose="02020603050405020304" pitchFamily="18" charset="0"/>
             </a:endParaRPr>
           </a:p>
           <a:p>
-            <a:pPr marL="0" marR="0" algn="ctr">
-              <a:spcBef>
-                <a:spcPts val="0"/>
-              </a:spcBef>
-              <a:spcAft>
-                <a:spcPts val="0"/>
-              </a:spcAft>
-            </a:pPr>
+            <a:pPr algn="ctr"/>
             <a:r>
               <a:rPr lang="en-US" sz="700" b="1" dirty="0">
                 <a:solidFill>
                   <a:srgbClr val="CC6600"/>
                 </a:solidFill>
-                <a:effectLst/>
                 <a:latin typeface="Arial Narrow" panose="020B0606020202030204" pitchFamily="34" charset="0"/>
                 <a:ea typeface="Times New Roman" panose="02020603050405020304" pitchFamily="18" charset="0"/>
               </a:rPr>
               <a:t>Allergies and Intolerances</a:t>
             </a:r>
             <a:endParaRPr lang="en-US" sz="1200" dirty="0">
-              <a:effectLst/>
               <a:latin typeface="Times New Roman" panose="02020603050405020304" pitchFamily="18" charset="0"/>
               <a:ea typeface="Times New Roman" panose="02020603050405020304" pitchFamily="18" charset="0"/>
             </a:endParaRPr>
           </a:p>
           <a:p>
-            <a:pPr marL="0" marR="0" algn="ctr">
-              <a:spcBef>
-                <a:spcPts val="0"/>
-              </a:spcBef>
-              <a:spcAft>
-                <a:spcPts val="0"/>
-              </a:spcAft>
-            </a:pPr>
+            <a:pPr algn="ctr"/>
             <a:r>
               <a:rPr lang="en-US" sz="700" b="1" dirty="0">
                 <a:solidFill>
                   <a:srgbClr val="CC6600"/>
                 </a:solidFill>
-                <a:effectLst/>
                 <a:latin typeface="Arial Narrow" panose="020B0606020202030204" pitchFamily="34" charset="0"/>
                 <a:ea typeface="Times New Roman" panose="02020603050405020304" pitchFamily="18" charset="0"/>
               </a:rPr>
               <a:t>Immunizations</a:t>
             </a:r>
             <a:endParaRPr lang="en-US" sz="1200" dirty="0">
-              <a:effectLst/>
               <a:latin typeface="Times New Roman" panose="02020603050405020304" pitchFamily="18" charset="0"/>
               <a:ea typeface="Times New Roman" panose="02020603050405020304" pitchFamily="18" charset="0"/>
             </a:endParaRPr>
           </a:p>
           <a:p>
-            <a:pPr marL="0" marR="0" algn="ctr">
-              <a:spcBef>
-                <a:spcPts val="0"/>
-              </a:spcBef>
-              <a:spcAft>
-                <a:spcPts val="0"/>
-              </a:spcAft>
-            </a:pPr>
+            <a:pPr algn="ctr"/>
             <a:r>
               <a:rPr lang="en-US" sz="700" b="1" dirty="0">
                 <a:solidFill>
                   <a:srgbClr val="CC6600"/>
                 </a:solidFill>
-                <a:effectLst/>
                 <a:latin typeface="Arial Narrow" panose="020B0606020202030204" pitchFamily="34" charset="0"/>
                 <a:ea typeface="Times New Roman" panose="02020603050405020304" pitchFamily="18" charset="0"/>
               </a:rPr>
               <a:t>Medications</a:t>
             </a:r>
             <a:endParaRPr lang="en-US" sz="1200" dirty="0">
-              <a:effectLst/>
               <a:latin typeface="Times New Roman" panose="02020603050405020304" pitchFamily="18" charset="0"/>
               <a:ea typeface="Times New Roman" panose="02020603050405020304" pitchFamily="18" charset="0"/>
             </a:endParaRPr>
           </a:p>
           <a:p>
-            <a:pPr marL="0" marR="0" algn="ctr">
-              <a:spcBef>
-                <a:spcPts val="0"/>
-              </a:spcBef>
-              <a:spcAft>
-                <a:spcPts val="0"/>
-              </a:spcAft>
-            </a:pPr>
+            <a:pPr algn="ctr"/>
             <a:r>
               <a:rPr lang="en-US" sz="700" b="1" dirty="0">
                 <a:solidFill>
                   <a:srgbClr val="CC6600"/>
                 </a:solidFill>
-                <a:effectLst/>
                 <a:latin typeface="Arial Narrow" panose="020B0606020202030204" pitchFamily="34" charset="0"/>
                 <a:ea typeface="Times New Roman" panose="02020603050405020304" pitchFamily="18" charset="0"/>
               </a:rPr>
               <a:t>Procedures</a:t>
             </a:r>
             <a:endParaRPr lang="en-US" sz="1200" dirty="0">
-              <a:effectLst/>
               <a:latin typeface="Times New Roman" panose="02020603050405020304" pitchFamily="18" charset="0"/>
               <a:ea typeface="Times New Roman" panose="02020603050405020304" pitchFamily="18" charset="0"/>
             </a:endParaRPr>
           </a:p>
           <a:p>
-            <a:pPr marL="0" marR="0" algn="ctr">
-              <a:spcBef>
-                <a:spcPts val="0"/>
-              </a:spcBef>
-              <a:spcAft>
-                <a:spcPts val="0"/>
-              </a:spcAft>
-            </a:pPr>
+            <a:pPr algn="ctr"/>
             <a:r>
               <a:rPr lang="en-US" sz="700" b="1" dirty="0">
                 <a:solidFill>
                   <a:srgbClr val="CC6600"/>
                 </a:solidFill>
-                <a:effectLst/>
                 <a:latin typeface="Arial Narrow" panose="020B0606020202030204" pitchFamily="34" charset="0"/>
                 <a:ea typeface="Times New Roman" panose="02020603050405020304" pitchFamily="18" charset="0"/>
               </a:rPr>
               <a:t>Encounters</a:t>
             </a:r>
             <a:endParaRPr lang="en-US" sz="1200" dirty="0">
-              <a:effectLst/>
               <a:latin typeface="Times New Roman" panose="02020603050405020304" pitchFamily="18" charset="0"/>
               <a:ea typeface="Times New Roman" panose="02020603050405020304" pitchFamily="18" charset="0"/>
             </a:endParaRPr>
@@ -11194,7 +10532,7 @@
 <file path=ppt/theme/theme1.xml><?xml version="1.0" encoding="utf-8"?>
 <a:theme xmlns:a="http://schemas.openxmlformats.org/drawingml/2006/main" name="Office Theme">
   <a:themeElements>
-    <a:clrScheme name="Office">
+    <a:clrScheme name="Office Theme">
       <a:dk1>
         <a:sysClr val="windowText" lastClr="000000"/>
       </a:dk1>
@@ -11232,7 +10570,7 @@
         <a:srgbClr val="954F72"/>
       </a:folHlink>
     </a:clrScheme>
-    <a:fontScheme name="Office">
+    <a:fontScheme name="Office Theme">
       <a:majorFont>
         <a:latin typeface="Calibri Light" panose="020F0302020204030204"/>
         <a:ea typeface=""/>
@@ -11267,23 +10605,6 @@
         <a:font script="Viet" typeface="Times New Roman"/>
         <a:font script="Uigh" typeface="Microsoft Uighur"/>
         <a:font script="Geor" typeface="Sylfaen"/>
-        <a:font script="Armn" typeface="Arial"/>
-        <a:font script="Bugi" typeface="Leelawadee UI"/>
-        <a:font script="Bopo" typeface="Microsoft JhengHei"/>
-        <a:font script="Java" typeface="Javanese Text"/>
-        <a:font script="Lisu" typeface="Segoe UI"/>
-        <a:font script="Mymr" typeface="Myanmar Text"/>
-        <a:font script="Nkoo" typeface="Ebrima"/>
-        <a:font script="Olck" typeface="Nirmala UI"/>
-        <a:font script="Osma" typeface="Ebrima"/>
-        <a:font script="Phag" typeface="Phagspa"/>
-        <a:font script="Syrn" typeface="Estrangelo Edessa"/>
-        <a:font script="Syrj" typeface="Estrangelo Edessa"/>
-        <a:font script="Syre" typeface="Estrangelo Edessa"/>
-        <a:font script="Sora" typeface="Nirmala UI"/>
-        <a:font script="Tale" typeface="Microsoft Tai Le"/>
-        <a:font script="Talu" typeface="Microsoft New Tai Lue"/>
-        <a:font script="Tfng" typeface="Ebrima"/>
       </a:majorFont>
       <a:minorFont>
         <a:latin typeface="Calibri" panose="020F0502020204030204"/>
@@ -11319,26 +10640,9 @@
         <a:font script="Viet" typeface="Arial"/>
         <a:font script="Uigh" typeface="Microsoft Uighur"/>
         <a:font script="Geor" typeface="Sylfaen"/>
-        <a:font script="Armn" typeface="Arial"/>
-        <a:font script="Bugi" typeface="Leelawadee UI"/>
-        <a:font script="Bopo" typeface="Microsoft JhengHei"/>
-        <a:font script="Java" typeface="Javanese Text"/>
-        <a:font script="Lisu" typeface="Segoe UI"/>
-        <a:font script="Mymr" typeface="Myanmar Text"/>
-        <a:font script="Nkoo" typeface="Ebrima"/>
-        <a:font script="Olck" typeface="Nirmala UI"/>
-        <a:font script="Osma" typeface="Ebrima"/>
-        <a:font script="Phag" typeface="Phagspa"/>
-        <a:font script="Syrn" typeface="Estrangelo Edessa"/>
-        <a:font script="Syrj" typeface="Estrangelo Edessa"/>
-        <a:font script="Syre" typeface="Estrangelo Edessa"/>
-        <a:font script="Sora" typeface="Nirmala UI"/>
-        <a:font script="Tale" typeface="Microsoft Tai Le"/>
-        <a:font script="Talu" typeface="Microsoft New Tai Lue"/>
-        <a:font script="Tfng" typeface="Ebrima"/>
       </a:minorFont>
     </a:fontScheme>
-    <a:fmtScheme name="Office">
+    <a:fmtScheme name="Office Theme">
       <a:fillStyleLst>
         <a:solidFill>
           <a:schemeClr val="phClr"/>

</xml_diff>